<commit_message>
Added some engine slides
</commit_message>
<xml_diff>
--- a/How to Make Games at Home for Cheap.pptx
+++ b/How to Make Games at Home for Cheap.pptx
@@ -12,8 +12,13 @@
     <p:sldId id="261" r:id="rId6"/>
     <p:sldId id="259" r:id="rId7"/>
     <p:sldId id="262" r:id="rId8"/>
-    <p:sldId id="258" r:id="rId9"/>
-    <p:sldId id="257" r:id="rId10"/>
+    <p:sldId id="265" r:id="rId9"/>
+    <p:sldId id="266" r:id="rId10"/>
+    <p:sldId id="267" r:id="rId11"/>
+    <p:sldId id="268" r:id="rId12"/>
+    <p:sldId id="269" r:id="rId13"/>
+    <p:sldId id="258" r:id="rId14"/>
+    <p:sldId id="257" r:id="rId15"/>
   </p:sldIdLst>
   <p:sldSz cx="12192000" cy="6858000"/>
   <p:notesSz cx="6858000" cy="9144000"/>
@@ -112,6 +117,11 @@
       </a:defRPr>
     </a:lvl9pPr>
   </p:defaultTextStyle>
+  <p:extLst>
+    <p:ext uri="{EFAFB233-063F-42B5-8137-9DF3F51BA10A}">
+      <p15:sldGuideLst xmlns:p15="http://schemas.microsoft.com/office/powerpoint/2012/main"/>
+    </p:ext>
+  </p:extLst>
 </p:presentation>
 </file>
 
@@ -5739,7 +5749,7 @@
           <a:p>
             <a:fld id="{8B57E792-C84F-4027-88D4-C053A09D18A8}" type="datetimeFigureOut">
               <a:rPr lang="en-US" smtClean="0"/>
-              <a:t>8/19/2019</a:t>
+              <a:t>8/20/2019</a:t>
             </a:fld>
             <a:endParaRPr lang="en-US"/>
           </a:p>
@@ -6014,7 +6024,7 @@
           <a:p>
             <a:fld id="{8B57E792-C84F-4027-88D4-C053A09D18A8}" type="datetimeFigureOut">
               <a:rPr lang="en-US" smtClean="0"/>
-              <a:t>8/19/2019</a:t>
+              <a:t>8/20/2019</a:t>
             </a:fld>
             <a:endParaRPr lang="en-US"/>
           </a:p>
@@ -6208,7 +6218,7 @@
           <a:p>
             <a:fld id="{8B57E792-C84F-4027-88D4-C053A09D18A8}" type="datetimeFigureOut">
               <a:rPr lang="en-US" smtClean="0"/>
-              <a:t>8/19/2019</a:t>
+              <a:t>8/20/2019</a:t>
             </a:fld>
             <a:endParaRPr lang="en-US"/>
           </a:p>
@@ -6481,7 +6491,7 @@
           <a:p>
             <a:fld id="{8B57E792-C84F-4027-88D4-C053A09D18A8}" type="datetimeFigureOut">
               <a:rPr lang="en-US" smtClean="0"/>
-              <a:t>8/19/2019</a:t>
+              <a:t>8/20/2019</a:t>
             </a:fld>
             <a:endParaRPr lang="en-US"/>
           </a:p>
@@ -6822,7 +6832,7 @@
           <a:p>
             <a:fld id="{8B57E792-C84F-4027-88D4-C053A09D18A8}" type="datetimeFigureOut">
               <a:rPr lang="en-US" smtClean="0"/>
-              <a:t>8/19/2019</a:t>
+              <a:t>8/20/2019</a:t>
             </a:fld>
             <a:endParaRPr lang="en-US"/>
           </a:p>
@@ -7445,7 +7455,7 @@
           <a:p>
             <a:fld id="{8B57E792-C84F-4027-88D4-C053A09D18A8}" type="datetimeFigureOut">
               <a:rPr lang="en-US" smtClean="0"/>
-              <a:t>8/19/2019</a:t>
+              <a:t>8/20/2019</a:t>
             </a:fld>
             <a:endParaRPr lang="en-US"/>
           </a:p>
@@ -8305,7 +8315,7 @@
           <a:p>
             <a:fld id="{8B57E792-C84F-4027-88D4-C053A09D18A8}" type="datetimeFigureOut">
               <a:rPr lang="en-US" smtClean="0"/>
-              <a:t>8/19/2019</a:t>
+              <a:t>8/20/2019</a:t>
             </a:fld>
             <a:endParaRPr lang="en-US"/>
           </a:p>
@@ -8475,7 +8485,7 @@
           <a:p>
             <a:fld id="{8B57E792-C84F-4027-88D4-C053A09D18A8}" type="datetimeFigureOut">
               <a:rPr lang="en-US" smtClean="0"/>
-              <a:t>8/19/2019</a:t>
+              <a:t>8/20/2019</a:t>
             </a:fld>
             <a:endParaRPr lang="en-US"/>
           </a:p>
@@ -8655,7 +8665,7 @@
           <a:p>
             <a:fld id="{8B57E792-C84F-4027-88D4-C053A09D18A8}" type="datetimeFigureOut">
               <a:rPr lang="en-US" smtClean="0"/>
-              <a:t>8/19/2019</a:t>
+              <a:t>8/20/2019</a:t>
             </a:fld>
             <a:endParaRPr lang="en-US"/>
           </a:p>
@@ -8825,7 +8835,7 @@
           <a:p>
             <a:fld id="{8B57E792-C84F-4027-88D4-C053A09D18A8}" type="datetimeFigureOut">
               <a:rPr lang="en-US" smtClean="0"/>
-              <a:t>8/19/2019</a:t>
+              <a:t>8/20/2019</a:t>
             </a:fld>
             <a:endParaRPr lang="en-US"/>
           </a:p>
@@ -9072,7 +9082,7 @@
           <a:p>
             <a:fld id="{8B57E792-C84F-4027-88D4-C053A09D18A8}" type="datetimeFigureOut">
               <a:rPr lang="en-US" smtClean="0"/>
-              <a:t>8/19/2019</a:t>
+              <a:t>8/20/2019</a:t>
             </a:fld>
             <a:endParaRPr lang="en-US"/>
           </a:p>
@@ -9364,7 +9374,7 @@
           <a:p>
             <a:fld id="{8B57E792-C84F-4027-88D4-C053A09D18A8}" type="datetimeFigureOut">
               <a:rPr lang="en-US" smtClean="0"/>
-              <a:t>8/19/2019</a:t>
+              <a:t>8/20/2019</a:t>
             </a:fld>
             <a:endParaRPr lang="en-US"/>
           </a:p>
@@ -9808,7 +9818,7 @@
           <a:p>
             <a:fld id="{8B57E792-C84F-4027-88D4-C053A09D18A8}" type="datetimeFigureOut">
               <a:rPr lang="en-US" smtClean="0"/>
-              <a:t>8/19/2019</a:t>
+              <a:t>8/20/2019</a:t>
             </a:fld>
             <a:endParaRPr lang="en-US"/>
           </a:p>
@@ -9926,7 +9936,7 @@
           <a:p>
             <a:fld id="{8B57E792-C84F-4027-88D4-C053A09D18A8}" type="datetimeFigureOut">
               <a:rPr lang="en-US" smtClean="0"/>
-              <a:t>8/19/2019</a:t>
+              <a:t>8/20/2019</a:t>
             </a:fld>
             <a:endParaRPr lang="en-US"/>
           </a:p>
@@ -10021,7 +10031,7 @@
           <a:p>
             <a:fld id="{8B57E792-C84F-4027-88D4-C053A09D18A8}" type="datetimeFigureOut">
               <a:rPr lang="en-US" smtClean="0"/>
-              <a:t>8/19/2019</a:t>
+              <a:t>8/20/2019</a:t>
             </a:fld>
             <a:endParaRPr lang="en-US"/>
           </a:p>
@@ -10300,7 +10310,7 @@
           <a:p>
             <a:fld id="{8B57E792-C84F-4027-88D4-C053A09D18A8}" type="datetimeFigureOut">
               <a:rPr lang="en-US" smtClean="0"/>
-              <a:t>8/19/2019</a:t>
+              <a:t>8/20/2019</a:t>
             </a:fld>
             <a:endParaRPr lang="en-US"/>
           </a:p>
@@ -10575,7 +10585,7 @@
           <a:p>
             <a:fld id="{8B57E792-C84F-4027-88D4-C053A09D18A8}" type="datetimeFigureOut">
               <a:rPr lang="en-US" smtClean="0"/>
-              <a:t>8/19/2019</a:t>
+              <a:t>8/20/2019</a:t>
             </a:fld>
             <a:endParaRPr lang="en-US"/>
           </a:p>
@@ -11004,7 +11014,7 @@
           <a:p>
             <a:fld id="{8B57E792-C84F-4027-88D4-C053A09D18A8}" type="datetimeFigureOut">
               <a:rPr lang="en-US" smtClean="0"/>
-              <a:t>8/19/2019</a:t>
+              <a:t>8/20/2019</a:t>
             </a:fld>
             <a:endParaRPr lang="en-US"/>
           </a:p>
@@ -11607,6 +11617,1618 @@
   </p:cSld>
   <p:clrMapOvr>
     <a:masterClrMapping/>
+  </p:clrMapOvr>
+</p:sld>
+</file>
+
+<file path=ppt/slides/slide10.xml><?xml version="1.0" encoding="utf-8"?>
+<p:sld xmlns:a="http://schemas.openxmlformats.org/drawingml/2006/main" xmlns:r="http://schemas.openxmlformats.org/officeDocument/2006/relationships" xmlns:p="http://schemas.openxmlformats.org/presentationml/2006/main">
+  <p:cSld>
+    <p:spTree>
+      <p:nvGrpSpPr>
+        <p:cNvPr id="1" name=""/>
+        <p:cNvGrpSpPr/>
+        <p:nvPr/>
+      </p:nvGrpSpPr>
+      <p:grpSpPr>
+        <a:xfrm>
+          <a:off x="0" y="0"/>
+          <a:ext cx="0" cy="0"/>
+          <a:chOff x="0" y="0"/>
+          <a:chExt cx="0" cy="0"/>
+        </a:xfrm>
+      </p:grpSpPr>
+      <p:sp>
+        <p:nvSpPr>
+          <p:cNvPr id="2" name="Title 1">
+            <a:extLst>
+              <a:ext uri="{FF2B5EF4-FFF2-40B4-BE49-F238E27FC236}">
+                <a16:creationId xmlns:a16="http://schemas.microsoft.com/office/drawing/2014/main" id="{C5523406-C399-4378-AC03-5BEC55494AB0}"/>
+              </a:ext>
+            </a:extLst>
+          </p:cNvPr>
+          <p:cNvSpPr>
+            <a:spLocks noGrp="1"/>
+          </p:cNvSpPr>
+          <p:nvPr>
+            <p:ph type="title"/>
+          </p:nvPr>
+        </p:nvSpPr>
+        <p:spPr/>
+        <p:txBody>
+          <a:bodyPr/>
+          <a:lstStyle/>
+          <a:p>
+            <a:r>
+              <a:rPr lang="en-US" dirty="0"/>
+              <a:t>Godot</a:t>
+            </a:r>
+          </a:p>
+        </p:txBody>
+      </p:sp>
+      <p:pic>
+        <p:nvPicPr>
+          <p:cNvPr id="6" name="Content Placeholder 5">
+            <a:extLst>
+              <a:ext uri="{FF2B5EF4-FFF2-40B4-BE49-F238E27FC236}">
+                <a16:creationId xmlns:a16="http://schemas.microsoft.com/office/drawing/2014/main" id="{F463E249-0094-4900-B436-94F50A911156}"/>
+              </a:ext>
+            </a:extLst>
+          </p:cNvPr>
+          <p:cNvPicPr>
+            <a:picLocks noGrp="1" noChangeAspect="1"/>
+          </p:cNvPicPr>
+          <p:nvPr>
+            <p:ph sz="half" idx="1"/>
+          </p:nvPr>
+        </p:nvPicPr>
+        <p:blipFill>
+          <a:blip r:embed="rId2">
+            <a:extLst>
+              <a:ext uri="{28A0092B-C50C-407E-A947-70E740481C1C}">
+                <a14:useLocalDpi xmlns:a14="http://schemas.microsoft.com/office/drawing/2010/main" val="0"/>
+              </a:ext>
+            </a:extLst>
+          </a:blip>
+          <a:stretch>
+            <a:fillRect/>
+          </a:stretch>
+        </p:blipFill>
+        <p:spPr>
+          <a:xfrm>
+            <a:off x="6374296" y="2417930"/>
+            <a:ext cx="5459344" cy="3070881"/>
+          </a:xfrm>
+        </p:spPr>
+      </p:pic>
+      <p:sp>
+        <p:nvSpPr>
+          <p:cNvPr id="4" name="Content Placeholder 3">
+            <a:extLst>
+              <a:ext uri="{FF2B5EF4-FFF2-40B4-BE49-F238E27FC236}">
+                <a16:creationId xmlns:a16="http://schemas.microsoft.com/office/drawing/2014/main" id="{D0E81EA2-E70C-466F-BF81-947E07971B5F}"/>
+              </a:ext>
+            </a:extLst>
+          </p:cNvPr>
+          <p:cNvSpPr>
+            <a:spLocks noGrp="1"/>
+          </p:cNvSpPr>
+          <p:nvPr>
+            <p:ph sz="half" idx="2"/>
+          </p:nvPr>
+        </p:nvSpPr>
+        <p:spPr>
+          <a:xfrm>
+            <a:off x="646111" y="1853248"/>
+            <a:ext cx="4396341" cy="4200245"/>
+          </a:xfrm>
+        </p:spPr>
+        <p:txBody>
+          <a:bodyPr/>
+          <a:lstStyle/>
+          <a:p>
+            <a:pPr marL="0" indent="0">
+              <a:buNone/>
+            </a:pPr>
+            <a:r>
+              <a:rPr lang="en-US" b="1" dirty="0"/>
+              <a:t>Pros</a:t>
+            </a:r>
+          </a:p>
+          <a:p>
+            <a:r>
+              <a:rPr lang="en-US" dirty="0"/>
+              <a:t>Completely free and open source</a:t>
+            </a:r>
+          </a:p>
+          <a:p>
+            <a:r>
+              <a:rPr lang="en-US" dirty="0"/>
+              <a:t>Just about as robust and powerful as its major competitors</a:t>
+            </a:r>
+          </a:p>
+          <a:p>
+            <a:r>
+              <a:rPr lang="en-US" dirty="0"/>
+              <a:t>Prop</a:t>
+            </a:r>
+          </a:p>
+          <a:p>
+            <a:pPr marL="0" indent="0">
+              <a:buNone/>
+            </a:pPr>
+            <a:r>
+              <a:rPr lang="en-US" b="1" dirty="0"/>
+              <a:t>Cons</a:t>
+            </a:r>
+            <a:endParaRPr lang="en-US" dirty="0"/>
+          </a:p>
+        </p:txBody>
+      </p:sp>
+    </p:spTree>
+    <p:extLst>
+      <p:ext uri="{BB962C8B-B14F-4D97-AF65-F5344CB8AC3E}">
+        <p14:creationId xmlns:p14="http://schemas.microsoft.com/office/powerpoint/2010/main" val="2297163571"/>
+      </p:ext>
+    </p:extLst>
+  </p:cSld>
+  <p:clrMapOvr>
+    <a:masterClrMapping/>
+  </p:clrMapOvr>
+</p:sld>
+</file>
+
+<file path=ppt/slides/slide11.xml><?xml version="1.0" encoding="utf-8"?>
+<p:sld xmlns:a="http://schemas.openxmlformats.org/drawingml/2006/main" xmlns:r="http://schemas.openxmlformats.org/officeDocument/2006/relationships" xmlns:p="http://schemas.openxmlformats.org/presentationml/2006/main">
+  <p:cSld>
+    <p:spTree>
+      <p:nvGrpSpPr>
+        <p:cNvPr id="1" name=""/>
+        <p:cNvGrpSpPr/>
+        <p:nvPr/>
+      </p:nvGrpSpPr>
+      <p:grpSpPr>
+        <a:xfrm>
+          <a:off x="0" y="0"/>
+          <a:ext cx="0" cy="0"/>
+          <a:chOff x="0" y="0"/>
+          <a:chExt cx="0" cy="0"/>
+        </a:xfrm>
+      </p:grpSpPr>
+      <p:sp>
+        <p:nvSpPr>
+          <p:cNvPr id="2" name="Title 1">
+            <a:extLst>
+              <a:ext uri="{FF2B5EF4-FFF2-40B4-BE49-F238E27FC236}">
+                <a16:creationId xmlns:a16="http://schemas.microsoft.com/office/drawing/2014/main" id="{C5523406-C399-4378-AC03-5BEC55494AB0}"/>
+              </a:ext>
+            </a:extLst>
+          </p:cNvPr>
+          <p:cNvSpPr>
+            <a:spLocks noGrp="1"/>
+          </p:cNvSpPr>
+          <p:nvPr>
+            <p:ph type="title"/>
+          </p:nvPr>
+        </p:nvSpPr>
+        <p:spPr/>
+        <p:txBody>
+          <a:bodyPr/>
+          <a:lstStyle/>
+          <a:p>
+            <a:r>
+              <a:rPr lang="en-US" dirty="0"/>
+              <a:t>RPG Maker</a:t>
+            </a:r>
+          </a:p>
+        </p:txBody>
+      </p:sp>
+      <p:pic>
+        <p:nvPicPr>
+          <p:cNvPr id="6" name="Content Placeholder 5">
+            <a:extLst>
+              <a:ext uri="{FF2B5EF4-FFF2-40B4-BE49-F238E27FC236}">
+                <a16:creationId xmlns:a16="http://schemas.microsoft.com/office/drawing/2014/main" id="{F463E249-0094-4900-B436-94F50A911156}"/>
+              </a:ext>
+            </a:extLst>
+          </p:cNvPr>
+          <p:cNvPicPr>
+            <a:picLocks noGrp="1" noChangeAspect="1"/>
+          </p:cNvPicPr>
+          <p:nvPr>
+            <p:ph sz="half" idx="1"/>
+          </p:nvPr>
+        </p:nvPicPr>
+        <p:blipFill>
+          <a:blip r:embed="rId2">
+            <a:extLst>
+              <a:ext uri="{28A0092B-C50C-407E-A947-70E740481C1C}">
+                <a14:useLocalDpi xmlns:a14="http://schemas.microsoft.com/office/drawing/2010/main" val="0"/>
+              </a:ext>
+            </a:extLst>
+          </a:blip>
+          <a:stretch>
+            <a:fillRect/>
+          </a:stretch>
+        </p:blipFill>
+        <p:spPr>
+          <a:xfrm>
+            <a:off x="6374296" y="2417930"/>
+            <a:ext cx="5459344" cy="3070881"/>
+          </a:xfrm>
+        </p:spPr>
+      </p:pic>
+      <p:sp>
+        <p:nvSpPr>
+          <p:cNvPr id="4" name="Content Placeholder 3">
+            <a:extLst>
+              <a:ext uri="{FF2B5EF4-FFF2-40B4-BE49-F238E27FC236}">
+                <a16:creationId xmlns:a16="http://schemas.microsoft.com/office/drawing/2014/main" id="{D0E81EA2-E70C-466F-BF81-947E07971B5F}"/>
+              </a:ext>
+            </a:extLst>
+          </p:cNvPr>
+          <p:cNvSpPr>
+            <a:spLocks noGrp="1"/>
+          </p:cNvSpPr>
+          <p:nvPr>
+            <p:ph sz="half" idx="2"/>
+          </p:nvPr>
+        </p:nvSpPr>
+        <p:spPr>
+          <a:xfrm>
+            <a:off x="646111" y="1853248"/>
+            <a:ext cx="4396341" cy="4200245"/>
+          </a:xfrm>
+        </p:spPr>
+        <p:txBody>
+          <a:bodyPr/>
+          <a:lstStyle/>
+          <a:p>
+            <a:pPr marL="0" indent="0">
+              <a:buNone/>
+            </a:pPr>
+            <a:r>
+              <a:rPr lang="en-US" b="1" dirty="0"/>
+              <a:t>Pros</a:t>
+            </a:r>
+            <a:endParaRPr lang="en-US" dirty="0"/>
+          </a:p>
+          <a:p>
+            <a:pPr marL="0" indent="0">
+              <a:buNone/>
+            </a:pPr>
+            <a:r>
+              <a:rPr lang="en-US" b="1" dirty="0"/>
+              <a:t>Cons</a:t>
+            </a:r>
+            <a:endParaRPr lang="en-US" dirty="0"/>
+          </a:p>
+        </p:txBody>
+      </p:sp>
+    </p:spTree>
+    <p:extLst>
+      <p:ext uri="{BB962C8B-B14F-4D97-AF65-F5344CB8AC3E}">
+        <p14:creationId xmlns:p14="http://schemas.microsoft.com/office/powerpoint/2010/main" val="2637080362"/>
+      </p:ext>
+    </p:extLst>
+  </p:cSld>
+  <p:clrMapOvr>
+    <a:masterClrMapping/>
+  </p:clrMapOvr>
+</p:sld>
+</file>
+
+<file path=ppt/slides/slide12.xml><?xml version="1.0" encoding="utf-8"?>
+<p:sld xmlns:a="http://schemas.openxmlformats.org/drawingml/2006/main" xmlns:r="http://schemas.openxmlformats.org/officeDocument/2006/relationships" xmlns:p="http://schemas.openxmlformats.org/presentationml/2006/main">
+  <p:cSld>
+    <p:spTree>
+      <p:nvGrpSpPr>
+        <p:cNvPr id="1" name=""/>
+        <p:cNvGrpSpPr/>
+        <p:nvPr/>
+      </p:nvGrpSpPr>
+      <p:grpSpPr>
+        <a:xfrm>
+          <a:off x="0" y="0"/>
+          <a:ext cx="0" cy="0"/>
+          <a:chOff x="0" y="0"/>
+          <a:chExt cx="0" cy="0"/>
+        </a:xfrm>
+      </p:grpSpPr>
+      <p:sp>
+        <p:nvSpPr>
+          <p:cNvPr id="2" name="Title 1">
+            <a:extLst>
+              <a:ext uri="{FF2B5EF4-FFF2-40B4-BE49-F238E27FC236}">
+                <a16:creationId xmlns:a16="http://schemas.microsoft.com/office/drawing/2014/main" id="{C5523406-C399-4378-AC03-5BEC55494AB0}"/>
+              </a:ext>
+            </a:extLst>
+          </p:cNvPr>
+          <p:cNvSpPr>
+            <a:spLocks noGrp="1"/>
+          </p:cNvSpPr>
+          <p:nvPr>
+            <p:ph type="title"/>
+          </p:nvPr>
+        </p:nvSpPr>
+        <p:spPr/>
+        <p:txBody>
+          <a:bodyPr/>
+          <a:lstStyle/>
+          <a:p>
+            <a:r>
+              <a:rPr lang="en-US" dirty="0"/>
+              <a:t>Twine</a:t>
+            </a:r>
+          </a:p>
+        </p:txBody>
+      </p:sp>
+      <p:pic>
+        <p:nvPicPr>
+          <p:cNvPr id="6" name="Content Placeholder 5">
+            <a:extLst>
+              <a:ext uri="{FF2B5EF4-FFF2-40B4-BE49-F238E27FC236}">
+                <a16:creationId xmlns:a16="http://schemas.microsoft.com/office/drawing/2014/main" id="{F463E249-0094-4900-B436-94F50A911156}"/>
+              </a:ext>
+            </a:extLst>
+          </p:cNvPr>
+          <p:cNvPicPr>
+            <a:picLocks noGrp="1" noChangeAspect="1"/>
+          </p:cNvPicPr>
+          <p:nvPr>
+            <p:ph sz="half" idx="1"/>
+          </p:nvPr>
+        </p:nvPicPr>
+        <p:blipFill>
+          <a:blip r:embed="rId2">
+            <a:extLst>
+              <a:ext uri="{28A0092B-C50C-407E-A947-70E740481C1C}">
+                <a14:useLocalDpi xmlns:a14="http://schemas.microsoft.com/office/drawing/2010/main" val="0"/>
+              </a:ext>
+            </a:extLst>
+          </a:blip>
+          <a:stretch>
+            <a:fillRect/>
+          </a:stretch>
+        </p:blipFill>
+        <p:spPr>
+          <a:xfrm>
+            <a:off x="6601676" y="2417930"/>
+            <a:ext cx="5004584" cy="3070881"/>
+          </a:xfrm>
+        </p:spPr>
+      </p:pic>
+      <p:sp>
+        <p:nvSpPr>
+          <p:cNvPr id="4" name="Content Placeholder 3">
+            <a:extLst>
+              <a:ext uri="{FF2B5EF4-FFF2-40B4-BE49-F238E27FC236}">
+                <a16:creationId xmlns:a16="http://schemas.microsoft.com/office/drawing/2014/main" id="{D0E81EA2-E70C-466F-BF81-947E07971B5F}"/>
+              </a:ext>
+            </a:extLst>
+          </p:cNvPr>
+          <p:cNvSpPr>
+            <a:spLocks noGrp="1"/>
+          </p:cNvSpPr>
+          <p:nvPr>
+            <p:ph sz="half" idx="2"/>
+          </p:nvPr>
+        </p:nvSpPr>
+        <p:spPr>
+          <a:xfrm>
+            <a:off x="646111" y="1853248"/>
+            <a:ext cx="4396341" cy="4200245"/>
+          </a:xfrm>
+        </p:spPr>
+        <p:txBody>
+          <a:bodyPr/>
+          <a:lstStyle/>
+          <a:p>
+            <a:pPr marL="0" indent="0">
+              <a:buNone/>
+            </a:pPr>
+            <a:r>
+              <a:rPr lang="en-US" b="1" dirty="0"/>
+              <a:t>Pros</a:t>
+            </a:r>
+            <a:endParaRPr lang="en-US" dirty="0"/>
+          </a:p>
+          <a:p>
+            <a:pPr marL="0" indent="0">
+              <a:buNone/>
+            </a:pPr>
+            <a:r>
+              <a:rPr lang="en-US" b="1" dirty="0"/>
+              <a:t>Cons</a:t>
+            </a:r>
+            <a:endParaRPr lang="en-US" dirty="0"/>
+          </a:p>
+        </p:txBody>
+      </p:sp>
+    </p:spTree>
+    <p:extLst>
+      <p:ext uri="{BB962C8B-B14F-4D97-AF65-F5344CB8AC3E}">
+        <p14:creationId xmlns:p14="http://schemas.microsoft.com/office/powerpoint/2010/main" val="384215990"/>
+      </p:ext>
+    </p:extLst>
+  </p:cSld>
+  <p:clrMapOvr>
+    <a:masterClrMapping/>
+  </p:clrMapOvr>
+</p:sld>
+</file>
+
+<file path=ppt/slides/slide13.xml><?xml version="1.0" encoding="utf-8"?>
+<p:sld xmlns:a="http://schemas.openxmlformats.org/drawingml/2006/main" xmlns:r="http://schemas.openxmlformats.org/officeDocument/2006/relationships" xmlns:p="http://schemas.openxmlformats.org/presentationml/2006/main">
+  <p:cSld>
+    <p:spTree>
+      <p:nvGrpSpPr>
+        <p:cNvPr id="1" name=""/>
+        <p:cNvGrpSpPr/>
+        <p:nvPr/>
+      </p:nvGrpSpPr>
+      <p:grpSpPr>
+        <a:xfrm>
+          <a:off x="0" y="0"/>
+          <a:ext cx="0" cy="0"/>
+          <a:chOff x="0" y="0"/>
+          <a:chExt cx="0" cy="0"/>
+        </a:xfrm>
+      </p:grpSpPr>
+      <p:sp>
+        <p:nvSpPr>
+          <p:cNvPr id="2" name="Title 1">
+            <a:extLst>
+              <a:ext uri="{FF2B5EF4-FFF2-40B4-BE49-F238E27FC236}">
+                <a16:creationId xmlns:a16="http://schemas.microsoft.com/office/drawing/2014/main" id="{96BEB878-A33E-4672-B69F-C76DCE9DFB83}"/>
+              </a:ext>
+            </a:extLst>
+          </p:cNvPr>
+          <p:cNvSpPr>
+            <a:spLocks noGrp="1"/>
+          </p:cNvSpPr>
+          <p:nvPr>
+            <p:ph type="title"/>
+          </p:nvPr>
+        </p:nvSpPr>
+        <p:spPr/>
+        <p:txBody>
+          <a:bodyPr/>
+          <a:lstStyle/>
+          <a:p>
+            <a:r>
+              <a:rPr lang="en-US" dirty="0"/>
+              <a:t>The Indie Economy</a:t>
+            </a:r>
+          </a:p>
+        </p:txBody>
+      </p:sp>
+      <p:sp>
+        <p:nvSpPr>
+          <p:cNvPr id="3" name="Content Placeholder 2">
+            <a:extLst>
+              <a:ext uri="{FF2B5EF4-FFF2-40B4-BE49-F238E27FC236}">
+                <a16:creationId xmlns:a16="http://schemas.microsoft.com/office/drawing/2014/main" id="{87F1C4CA-2D5C-403A-8FBC-2930A10CA764}"/>
+              </a:ext>
+            </a:extLst>
+          </p:cNvPr>
+          <p:cNvSpPr>
+            <a:spLocks noGrp="1"/>
+          </p:cNvSpPr>
+          <p:nvPr>
+            <p:ph idx="1"/>
+          </p:nvPr>
+        </p:nvSpPr>
+        <p:spPr/>
+        <p:txBody>
+          <a:bodyPr/>
+          <a:lstStyle/>
+          <a:p>
+            <a:r>
+              <a:rPr lang="en-US" dirty="0"/>
+              <a:t>Golden rule of independent game design – If you spend money to make a game, you’ve lost money.</a:t>
+            </a:r>
+          </a:p>
+          <a:p>
+            <a:r>
+              <a:rPr lang="en-US" dirty="0"/>
+              <a:t>There is a lot of money in the scene, just not for any of us.</a:t>
+            </a:r>
+          </a:p>
+        </p:txBody>
+      </p:sp>
+    </p:spTree>
+    <p:extLst>
+      <p:ext uri="{BB962C8B-B14F-4D97-AF65-F5344CB8AC3E}">
+        <p14:creationId xmlns:p14="http://schemas.microsoft.com/office/powerpoint/2010/main" val="1116587354"/>
+      </p:ext>
+    </p:extLst>
+  </p:cSld>
+  <p:clrMapOvr>
+    <a:masterClrMapping/>
+  </p:clrMapOvr>
+</p:sld>
+</file>
+
+<file path=ppt/slides/slide14.xml><?xml version="1.0" encoding="utf-8"?>
+<p:sld xmlns:a="http://schemas.openxmlformats.org/drawingml/2006/main" xmlns:r="http://schemas.openxmlformats.org/officeDocument/2006/relationships" xmlns:p="http://schemas.openxmlformats.org/presentationml/2006/main">
+  <p:cSld>
+    <p:bg>
+      <p:bgPr>
+        <a:solidFill>
+          <a:schemeClr val="bg1"/>
+        </a:solidFill>
+        <a:effectLst/>
+      </p:bgPr>
+    </p:bg>
+    <p:spTree>
+      <p:nvGrpSpPr>
+        <p:cNvPr id="1" name=""/>
+        <p:cNvGrpSpPr/>
+        <p:nvPr/>
+      </p:nvGrpSpPr>
+      <p:grpSpPr>
+        <a:xfrm>
+          <a:off x="0" y="0"/>
+          <a:ext cx="0" cy="0"/>
+          <a:chOff x="0" y="0"/>
+          <a:chExt cx="0" cy="0"/>
+        </a:xfrm>
+      </p:grpSpPr>
+      <p:sp>
+        <p:nvSpPr>
+          <p:cNvPr id="28" name="Rectangle 27">
+            <a:extLst>
+              <a:ext uri="{FF2B5EF4-FFF2-40B4-BE49-F238E27FC236}">
+                <a16:creationId xmlns:a16="http://schemas.microsoft.com/office/drawing/2014/main" id="{F747F1B4-B831-4277-8AB0-32767F7EB7BF}"/>
+              </a:ext>
+              <a:ext uri="{C183D7F6-B498-43B3-948B-1728B52AA6E4}">
+                <adec:decorative xmlns:adec="http://schemas.microsoft.com/office/drawing/2017/decorative" val="1"/>
+              </a:ext>
+            </a:extLst>
+          </p:cNvPr>
+          <p:cNvSpPr>
+            <a:spLocks noGrp="1" noRot="1" noChangeAspect="1" noMove="1" noResize="1" noEditPoints="1" noAdjustHandles="1" noChangeArrowheads="1" noChangeShapeType="1" noTextEdit="1"/>
+          </p:cNvSpPr>
+          <p:nvPr>
+            <p:extLst>
+              <p:ext uri="{386F3935-93C4-4BCD-93E2-E3B085C9AB24}">
+                <p16:designElem xmlns:p16="http://schemas.microsoft.com/office/powerpoint/2015/main" val="1"/>
+              </p:ext>
+            </p:extLst>
+          </p:nvPr>
+        </p:nvSpPr>
+        <p:spPr>
+          <a:xfrm>
+            <a:off x="0" y="0"/>
+            <a:ext cx="12191999" cy="6858000"/>
+          </a:xfrm>
+          <a:prstGeom prst="rect">
+            <a:avLst/>
+          </a:prstGeom>
+          <a:ln>
+            <a:noFill/>
+          </a:ln>
+        </p:spPr>
+        <p:style>
+          <a:lnRef idx="2">
+            <a:schemeClr val="accent1">
+              <a:shade val="50000"/>
+            </a:schemeClr>
+          </a:lnRef>
+          <a:fillRef idx="1003">
+            <a:schemeClr val="dk2"/>
+          </a:fillRef>
+          <a:effectRef idx="0">
+            <a:schemeClr val="accent1"/>
+          </a:effectRef>
+          <a:fontRef idx="minor">
+            <a:schemeClr val="lt1"/>
+          </a:fontRef>
+        </p:style>
+        <p:txBody>
+          <a:bodyPr rtlCol="0" anchor="ctr"/>
+          <a:lstStyle/>
+          <a:p>
+            <a:pPr algn="ctr"/>
+            <a:endParaRPr lang="en-US"/>
+          </a:p>
+        </p:txBody>
+      </p:sp>
+      <p:sp>
+        <p:nvSpPr>
+          <p:cNvPr id="30" name="Freeform 7">
+            <a:extLst>
+              <a:ext uri="{FF2B5EF4-FFF2-40B4-BE49-F238E27FC236}">
+                <a16:creationId xmlns:a16="http://schemas.microsoft.com/office/drawing/2014/main" id="{D80CFA21-AB7C-4BEB-9BFF-05764FBBF3C6}"/>
+              </a:ext>
+              <a:ext uri="{C183D7F6-B498-43B3-948B-1728B52AA6E4}">
+                <adec:decorative xmlns:adec="http://schemas.microsoft.com/office/drawing/2017/decorative" val="1"/>
+              </a:ext>
+            </a:extLst>
+          </p:cNvPr>
+          <p:cNvSpPr>
+            <a:spLocks noGrp="1" noRot="1" noChangeAspect="1" noMove="1" noResize="1" noEditPoints="1" noAdjustHandles="1" noChangeArrowheads="1" noChangeShapeType="1" noTextEdit="1"/>
+          </p:cNvSpPr>
+          <p:nvPr>
+            <p:extLst>
+              <p:ext uri="{386F3935-93C4-4BCD-93E2-E3B085C9AB24}">
+                <p16:designElem xmlns:p16="http://schemas.microsoft.com/office/powerpoint/2015/main" val="1"/>
+              </p:ext>
+            </p:extLst>
+          </p:nvPr>
+        </p:nvSpPr>
+        <p:spPr>
+          <a:xfrm>
+            <a:off x="8719939" y="1460230"/>
+            <a:ext cx="3472060" cy="825932"/>
+          </a:xfrm>
+          <a:custGeom>
+            <a:avLst/>
+            <a:gdLst>
+              <a:gd name="connsiteX0" fmla="*/ 3470310 w 3472060"/>
+              <a:gd name="connsiteY0" fmla="*/ 0 h 825932"/>
+              <a:gd name="connsiteX1" fmla="*/ 3472060 w 3472060"/>
+              <a:gd name="connsiteY1" fmla="*/ 12850 h 825932"/>
+              <a:gd name="connsiteX2" fmla="*/ 3472060 w 3472060"/>
+              <a:gd name="connsiteY2" fmla="*/ 480529 h 825932"/>
+              <a:gd name="connsiteX3" fmla="*/ 3363699 w 3472060"/>
+              <a:gd name="connsiteY3" fmla="*/ 498471 h 825932"/>
+              <a:gd name="connsiteX4" fmla="*/ 42060 w 3472060"/>
+              <a:gd name="connsiteY4" fmla="*/ 824486 h 825932"/>
+              <a:gd name="connsiteX5" fmla="*/ 0 w 3472060"/>
+              <a:gd name="connsiteY5" fmla="*/ 758452 h 825932"/>
+              <a:gd name="connsiteX6" fmla="*/ 188014 w 3472060"/>
+              <a:gd name="connsiteY6" fmla="*/ 735602 h 825932"/>
+              <a:gd name="connsiteX7" fmla="*/ 284087 w 3472060"/>
+              <a:gd name="connsiteY7" fmla="*/ 722590 h 825932"/>
+              <a:gd name="connsiteX8" fmla="*/ 382288 w 3472060"/>
+              <a:gd name="connsiteY8" fmla="*/ 709392 h 825932"/>
+              <a:gd name="connsiteX9" fmla="*/ 481858 w 3472060"/>
+              <a:gd name="connsiteY9" fmla="*/ 695774 h 825932"/>
+              <a:gd name="connsiteX10" fmla="*/ 581897 w 3472060"/>
+              <a:gd name="connsiteY10" fmla="*/ 680711 h 825932"/>
+              <a:gd name="connsiteX11" fmla="*/ 683670 w 3472060"/>
+              <a:gd name="connsiteY11" fmla="*/ 665256 h 825932"/>
+              <a:gd name="connsiteX12" fmla="*/ 787206 w 3472060"/>
+              <a:gd name="connsiteY12" fmla="*/ 649587 h 825932"/>
+              <a:gd name="connsiteX13" fmla="*/ 892019 w 3472060"/>
+              <a:gd name="connsiteY13" fmla="*/ 632968 h 825932"/>
+              <a:gd name="connsiteX14" fmla="*/ 997620 w 3472060"/>
+              <a:gd name="connsiteY14" fmla="*/ 614667 h 825932"/>
+              <a:gd name="connsiteX15" fmla="*/ 1104727 w 3472060"/>
+              <a:gd name="connsiteY15" fmla="*/ 596741 h 825932"/>
+              <a:gd name="connsiteX16" fmla="*/ 1212669 w 3472060"/>
+              <a:gd name="connsiteY16" fmla="*/ 577397 h 825932"/>
+              <a:gd name="connsiteX17" fmla="*/ 1321506 w 3472060"/>
+              <a:gd name="connsiteY17" fmla="*/ 556988 h 825932"/>
+              <a:gd name="connsiteX18" fmla="*/ 1430709 w 3472060"/>
+              <a:gd name="connsiteY18" fmla="*/ 536607 h 825932"/>
+              <a:gd name="connsiteX19" fmla="*/ 1541050 w 3472060"/>
+              <a:gd name="connsiteY19" fmla="*/ 514481 h 825932"/>
+              <a:gd name="connsiteX20" fmla="*/ 1652805 w 3472060"/>
+              <a:gd name="connsiteY20" fmla="*/ 492202 h 825932"/>
+              <a:gd name="connsiteX21" fmla="*/ 1763708 w 3472060"/>
+              <a:gd name="connsiteY21" fmla="*/ 469161 h 825932"/>
+              <a:gd name="connsiteX22" fmla="*/ 1875795 w 3472060"/>
+              <a:gd name="connsiteY22" fmla="*/ 444641 h 825932"/>
+              <a:gd name="connsiteX23" fmla="*/ 1989128 w 3472060"/>
+              <a:gd name="connsiteY23" fmla="*/ 418995 h 825932"/>
+              <a:gd name="connsiteX24" fmla="*/ 2102476 w 3472060"/>
+              <a:gd name="connsiteY24" fmla="*/ 393438 h 825932"/>
+              <a:gd name="connsiteX25" fmla="*/ 2215549 w 3472060"/>
+              <a:gd name="connsiteY25" fmla="*/ 366291 h 825932"/>
+              <a:gd name="connsiteX26" fmla="*/ 2330490 w 3472060"/>
+              <a:gd name="connsiteY26" fmla="*/ 337455 h 825932"/>
+              <a:gd name="connsiteX27" fmla="*/ 2443333 w 3472060"/>
+              <a:gd name="connsiteY27" fmla="*/ 308983 h 825932"/>
+              <a:gd name="connsiteX28" fmla="*/ 2558014 w 3472060"/>
+              <a:gd name="connsiteY28" fmla="*/ 278646 h 825932"/>
+              <a:gd name="connsiteX29" fmla="*/ 2673621 w 3472060"/>
+              <a:gd name="connsiteY29" fmla="*/ 247421 h 825932"/>
+              <a:gd name="connsiteX30" fmla="*/ 2787008 w 3472060"/>
+              <a:gd name="connsiteY30" fmla="*/ 215853 h 825932"/>
+              <a:gd name="connsiteX31" fmla="*/ 2901442 w 3472060"/>
+              <a:gd name="connsiteY31" fmla="*/ 182011 h 825932"/>
+              <a:gd name="connsiteX32" fmla="*/ 3015722 w 3472060"/>
+              <a:gd name="connsiteY32" fmla="*/ 147286 h 825932"/>
+              <a:gd name="connsiteX33" fmla="*/ 3130018 w 3472060"/>
+              <a:gd name="connsiteY33" fmla="*/ 112649 h 825932"/>
+              <a:gd name="connsiteX34" fmla="*/ 3243551 w 3472060"/>
+              <a:gd name="connsiteY34" fmla="*/ 75688 h 825932"/>
+              <a:gd name="connsiteX35" fmla="*/ 3356992 w 3472060"/>
+              <a:gd name="connsiteY35" fmla="*/ 38197 h 825932"/>
+              <a:gd name="connsiteX36" fmla="*/ 3470310 w 3472060"/>
+              <a:gd name="connsiteY36" fmla="*/ 0 h 825932"/>
+            </a:gdLst>
+            <a:ahLst/>
+            <a:cxnLst>
+              <a:cxn ang="0">
+                <a:pos x="connsiteX0" y="connsiteY0"/>
+              </a:cxn>
+              <a:cxn ang="0">
+                <a:pos x="connsiteX1" y="connsiteY1"/>
+              </a:cxn>
+              <a:cxn ang="0">
+                <a:pos x="connsiteX2" y="connsiteY2"/>
+              </a:cxn>
+              <a:cxn ang="0">
+                <a:pos x="connsiteX3" y="connsiteY3"/>
+              </a:cxn>
+              <a:cxn ang="0">
+                <a:pos x="connsiteX4" y="connsiteY4"/>
+              </a:cxn>
+              <a:cxn ang="0">
+                <a:pos x="connsiteX5" y="connsiteY5"/>
+              </a:cxn>
+              <a:cxn ang="0">
+                <a:pos x="connsiteX6" y="connsiteY6"/>
+              </a:cxn>
+              <a:cxn ang="0">
+                <a:pos x="connsiteX7" y="connsiteY7"/>
+              </a:cxn>
+              <a:cxn ang="0">
+                <a:pos x="connsiteX8" y="connsiteY8"/>
+              </a:cxn>
+              <a:cxn ang="0">
+                <a:pos x="connsiteX9" y="connsiteY9"/>
+              </a:cxn>
+              <a:cxn ang="0">
+                <a:pos x="connsiteX10" y="connsiteY10"/>
+              </a:cxn>
+              <a:cxn ang="0">
+                <a:pos x="connsiteX11" y="connsiteY11"/>
+              </a:cxn>
+              <a:cxn ang="0">
+                <a:pos x="connsiteX12" y="connsiteY12"/>
+              </a:cxn>
+              <a:cxn ang="0">
+                <a:pos x="connsiteX13" y="connsiteY13"/>
+              </a:cxn>
+              <a:cxn ang="0">
+                <a:pos x="connsiteX14" y="connsiteY14"/>
+              </a:cxn>
+              <a:cxn ang="0">
+                <a:pos x="connsiteX15" y="connsiteY15"/>
+              </a:cxn>
+              <a:cxn ang="0">
+                <a:pos x="connsiteX16" y="connsiteY16"/>
+              </a:cxn>
+              <a:cxn ang="0">
+                <a:pos x="connsiteX17" y="connsiteY17"/>
+              </a:cxn>
+              <a:cxn ang="0">
+                <a:pos x="connsiteX18" y="connsiteY18"/>
+              </a:cxn>
+              <a:cxn ang="0">
+                <a:pos x="connsiteX19" y="connsiteY19"/>
+              </a:cxn>
+              <a:cxn ang="0">
+                <a:pos x="connsiteX20" y="connsiteY20"/>
+              </a:cxn>
+              <a:cxn ang="0">
+                <a:pos x="connsiteX21" y="connsiteY21"/>
+              </a:cxn>
+              <a:cxn ang="0">
+                <a:pos x="connsiteX22" y="connsiteY22"/>
+              </a:cxn>
+              <a:cxn ang="0">
+                <a:pos x="connsiteX23" y="connsiteY23"/>
+              </a:cxn>
+              <a:cxn ang="0">
+                <a:pos x="connsiteX24" y="connsiteY24"/>
+              </a:cxn>
+              <a:cxn ang="0">
+                <a:pos x="connsiteX25" y="connsiteY25"/>
+              </a:cxn>
+              <a:cxn ang="0">
+                <a:pos x="connsiteX26" y="connsiteY26"/>
+              </a:cxn>
+              <a:cxn ang="0">
+                <a:pos x="connsiteX27" y="connsiteY27"/>
+              </a:cxn>
+              <a:cxn ang="0">
+                <a:pos x="connsiteX28" y="connsiteY28"/>
+              </a:cxn>
+              <a:cxn ang="0">
+                <a:pos x="connsiteX29" y="connsiteY29"/>
+              </a:cxn>
+              <a:cxn ang="0">
+                <a:pos x="connsiteX30" y="connsiteY30"/>
+              </a:cxn>
+              <a:cxn ang="0">
+                <a:pos x="connsiteX31" y="connsiteY31"/>
+              </a:cxn>
+              <a:cxn ang="0">
+                <a:pos x="connsiteX32" y="connsiteY32"/>
+              </a:cxn>
+              <a:cxn ang="0">
+                <a:pos x="connsiteX33" y="connsiteY33"/>
+              </a:cxn>
+              <a:cxn ang="0">
+                <a:pos x="connsiteX34" y="connsiteY34"/>
+              </a:cxn>
+              <a:cxn ang="0">
+                <a:pos x="connsiteX35" y="connsiteY35"/>
+              </a:cxn>
+              <a:cxn ang="0">
+                <a:pos x="connsiteX36" y="connsiteY36"/>
+              </a:cxn>
+            </a:cxnLst>
+            <a:rect l="l" t="t" r="r" b="b"/>
+            <a:pathLst>
+              <a:path w="3472060" h="825932">
+                <a:moveTo>
+                  <a:pt x="3470310" y="0"/>
+                </a:moveTo>
+                <a:lnTo>
+                  <a:pt x="3472060" y="12850"/>
+                </a:lnTo>
+                <a:lnTo>
+                  <a:pt x="3472060" y="480529"/>
+                </a:lnTo>
+                <a:lnTo>
+                  <a:pt x="3363699" y="498471"/>
+                </a:lnTo>
+                <a:cubicBezTo>
+                  <a:pt x="2435623" y="645518"/>
+                  <a:pt x="603076" y="844866"/>
+                  <a:pt x="42060" y="824486"/>
+                </a:cubicBezTo>
+                <a:cubicBezTo>
+                  <a:pt x="28151" y="802425"/>
+                  <a:pt x="13909" y="780513"/>
+                  <a:pt x="0" y="758452"/>
+                </a:cubicBezTo>
+                <a:lnTo>
+                  <a:pt x="188014" y="735602"/>
+                </a:lnTo>
+                <a:lnTo>
+                  <a:pt x="284087" y="722590"/>
+                </a:lnTo>
+                <a:lnTo>
+                  <a:pt x="382288" y="709392"/>
+                </a:lnTo>
+                <a:lnTo>
+                  <a:pt x="481858" y="695774"/>
+                </a:lnTo>
+                <a:lnTo>
+                  <a:pt x="581897" y="680711"/>
+                </a:lnTo>
+                <a:lnTo>
+                  <a:pt x="683670" y="665256"/>
+                </a:lnTo>
+                <a:lnTo>
+                  <a:pt x="787206" y="649587"/>
+                </a:lnTo>
+                <a:lnTo>
+                  <a:pt x="892019" y="632968"/>
+                </a:lnTo>
+                <a:lnTo>
+                  <a:pt x="997620" y="614667"/>
+                </a:lnTo>
+                <a:lnTo>
+                  <a:pt x="1104727" y="596741"/>
+                </a:lnTo>
+                <a:lnTo>
+                  <a:pt x="1212669" y="577397"/>
+                </a:lnTo>
+                <a:lnTo>
+                  <a:pt x="1321506" y="556988"/>
+                </a:lnTo>
+                <a:lnTo>
+                  <a:pt x="1430709" y="536607"/>
+                </a:lnTo>
+                <a:lnTo>
+                  <a:pt x="1541050" y="514481"/>
+                </a:lnTo>
+                <a:lnTo>
+                  <a:pt x="1652805" y="492202"/>
+                </a:lnTo>
+                <a:lnTo>
+                  <a:pt x="1763708" y="469161"/>
+                </a:lnTo>
+                <a:lnTo>
+                  <a:pt x="1875795" y="444641"/>
+                </a:lnTo>
+                <a:lnTo>
+                  <a:pt x="1989128" y="418995"/>
+                </a:lnTo>
+                <a:lnTo>
+                  <a:pt x="2102476" y="393438"/>
+                </a:lnTo>
+                <a:lnTo>
+                  <a:pt x="2215549" y="366291"/>
+                </a:lnTo>
+                <a:lnTo>
+                  <a:pt x="2330490" y="337455"/>
+                </a:lnTo>
+                <a:lnTo>
+                  <a:pt x="2443333" y="308983"/>
+                </a:lnTo>
+                <a:lnTo>
+                  <a:pt x="2558014" y="278646"/>
+                </a:lnTo>
+                <a:lnTo>
+                  <a:pt x="2673621" y="247421"/>
+                </a:lnTo>
+                <a:lnTo>
+                  <a:pt x="2787008" y="215853"/>
+                </a:lnTo>
+                <a:lnTo>
+                  <a:pt x="2901442" y="182011"/>
+                </a:lnTo>
+                <a:lnTo>
+                  <a:pt x="3015722" y="147286"/>
+                </a:lnTo>
+                <a:lnTo>
+                  <a:pt x="3130018" y="112649"/>
+                </a:lnTo>
+                <a:lnTo>
+                  <a:pt x="3243551" y="75688"/>
+                </a:lnTo>
+                <a:lnTo>
+                  <a:pt x="3356992" y="38197"/>
+                </a:lnTo>
+                <a:lnTo>
+                  <a:pt x="3470310" y="0"/>
+                </a:lnTo>
+                <a:close/>
+              </a:path>
+            </a:pathLst>
+          </a:custGeom>
+          <a:solidFill>
+            <a:schemeClr val="bg1">
+              <a:alpha val="20000"/>
+            </a:schemeClr>
+          </a:solidFill>
+          <a:ln>
+            <a:noFill/>
+          </a:ln>
+        </p:spPr>
+        <p:txBody>
+          <a:bodyPr rtlCol="0" anchor="ctr"/>
+          <a:lstStyle/>
+          <a:p>
+            <a:pPr algn="ctr"/>
+            <a:endParaRPr lang="en-US">
+              <a:solidFill>
+                <a:schemeClr val="tx1"/>
+              </a:solidFill>
+            </a:endParaRPr>
+          </a:p>
+        </p:txBody>
+      </p:sp>
+      <p:sp>
+        <p:nvSpPr>
+          <p:cNvPr id="2" name="Title 1">
+            <a:extLst>
+              <a:ext uri="{FF2B5EF4-FFF2-40B4-BE49-F238E27FC236}">
+                <a16:creationId xmlns:a16="http://schemas.microsoft.com/office/drawing/2014/main" id="{58468BC1-1002-4552-9E98-4818863C8BAB}"/>
+              </a:ext>
+            </a:extLst>
+          </p:cNvPr>
+          <p:cNvSpPr>
+            <a:spLocks noGrp="1"/>
+          </p:cNvSpPr>
+          <p:nvPr>
+            <p:ph type="title"/>
+          </p:nvPr>
+        </p:nvSpPr>
+        <p:spPr>
+          <a:xfrm>
+            <a:off x="648930" y="629267"/>
+            <a:ext cx="9252154" cy="1016654"/>
+          </a:xfrm>
+        </p:spPr>
+        <p:txBody>
+          <a:bodyPr>
+            <a:normAutofit/>
+          </a:bodyPr>
+          <a:lstStyle/>
+          <a:p>
+            <a:r>
+              <a:rPr lang="en-US">
+                <a:solidFill>
+                  <a:srgbClr val="EBEBEB"/>
+                </a:solidFill>
+              </a:rPr>
+              <a:t>Parting Advice</a:t>
+            </a:r>
+          </a:p>
+        </p:txBody>
+      </p:sp>
+      <p:sp>
+        <p:nvSpPr>
+          <p:cNvPr id="32" name="Rectangle 31">
+            <a:extLst>
+              <a:ext uri="{FF2B5EF4-FFF2-40B4-BE49-F238E27FC236}">
+                <a16:creationId xmlns:a16="http://schemas.microsoft.com/office/drawing/2014/main" id="{12F7E335-851A-4CAE-B09F-E657819D4600}"/>
+              </a:ext>
+              <a:ext uri="{C183D7F6-B498-43B3-948B-1728B52AA6E4}">
+                <adec:decorative xmlns:adec="http://schemas.microsoft.com/office/drawing/2017/decorative" val="1"/>
+              </a:ext>
+            </a:extLst>
+          </p:cNvPr>
+          <p:cNvSpPr>
+            <a:spLocks noGrp="1" noRot="1" noChangeAspect="1" noMove="1" noResize="1" noEditPoints="1" noAdjustHandles="1" noChangeArrowheads="1" noChangeShapeType="1" noTextEdit="1"/>
+          </p:cNvSpPr>
+          <p:nvPr>
+            <p:extLst>
+              <p:ext uri="{386F3935-93C4-4BCD-93E2-E3B085C9AB24}">
+                <p16:designElem xmlns:p16="http://schemas.microsoft.com/office/powerpoint/2015/main" val="1"/>
+              </p:ext>
+            </p:extLst>
+          </p:nvPr>
+        </p:nvSpPr>
+        <p:spPr>
+          <a:xfrm>
+            <a:off x="10437812" y="0"/>
+            <a:ext cx="685800" cy="1143000"/>
+          </a:xfrm>
+          <a:prstGeom prst="rect">
+            <a:avLst/>
+          </a:prstGeom>
+          <a:solidFill>
+            <a:schemeClr val="accent1"/>
+          </a:solidFill>
+          <a:ln>
+            <a:noFill/>
+          </a:ln>
+        </p:spPr>
+        <p:style>
+          <a:lnRef idx="1">
+            <a:schemeClr val="accent1"/>
+          </a:lnRef>
+          <a:fillRef idx="3">
+            <a:schemeClr val="accent1"/>
+          </a:fillRef>
+          <a:effectRef idx="2">
+            <a:schemeClr val="accent1"/>
+          </a:effectRef>
+          <a:fontRef idx="minor">
+            <a:schemeClr val="lt1"/>
+          </a:fontRef>
+        </p:style>
+      </p:sp>
+      <p:sp>
+        <p:nvSpPr>
+          <p:cNvPr id="34" name="Freeform: Shape 33">
+            <a:extLst>
+              <a:ext uri="{FF2B5EF4-FFF2-40B4-BE49-F238E27FC236}">
+                <a16:creationId xmlns:a16="http://schemas.microsoft.com/office/drawing/2014/main" id="{10B541F0-7F6E-402E-84D8-CF96EACA5FBC}"/>
+              </a:ext>
+              <a:ext uri="{C183D7F6-B498-43B3-948B-1728B52AA6E4}">
+                <adec:decorative xmlns:adec="http://schemas.microsoft.com/office/drawing/2017/decorative" val="1"/>
+              </a:ext>
+            </a:extLst>
+          </p:cNvPr>
+          <p:cNvSpPr>
+            <a:spLocks noGrp="1" noRot="1" noChangeAspect="1" noMove="1" noResize="1" noEditPoints="1" noAdjustHandles="1" noChangeArrowheads="1" noChangeShapeType="1" noTextEdit="1"/>
+          </p:cNvSpPr>
+          <p:nvPr>
+            <p:extLst>
+              <p:ext uri="{386F3935-93C4-4BCD-93E2-E3B085C9AB24}">
+                <p16:designElem xmlns:p16="http://schemas.microsoft.com/office/powerpoint/2015/main" val="1"/>
+              </p:ext>
+            </p:extLst>
+          </p:nvPr>
+        </p:nvSpPr>
+        <p:spPr bwMode="gray">
+          <a:xfrm>
+            <a:off x="-1" y="1762067"/>
+            <a:ext cx="12192418" cy="5095933"/>
+          </a:xfrm>
+          <a:custGeom>
+            <a:avLst/>
+            <a:gdLst>
+              <a:gd name="connsiteX0" fmla="*/ 1 w 12192418"/>
+              <a:gd name="connsiteY0" fmla="*/ 0 h 5095933"/>
+              <a:gd name="connsiteX1" fmla="*/ 71932 w 12192418"/>
+              <a:gd name="connsiteY1" fmla="*/ 12261 h 5095933"/>
+              <a:gd name="connsiteX2" fmla="*/ 282849 w 12192418"/>
+              <a:gd name="connsiteY2" fmla="*/ 48343 h 5095933"/>
+              <a:gd name="connsiteX3" fmla="*/ 436464 w 12192418"/>
+              <a:gd name="connsiteY3" fmla="*/ 73565 h 5095933"/>
+              <a:gd name="connsiteX4" fmla="*/ 619339 w 12192418"/>
+              <a:gd name="connsiteY4" fmla="*/ 100188 h 5095933"/>
+              <a:gd name="connsiteX5" fmla="*/ 836351 w 12192418"/>
+              <a:gd name="connsiteY5" fmla="*/ 132066 h 5095933"/>
+              <a:gd name="connsiteX6" fmla="*/ 1076528 w 12192418"/>
+              <a:gd name="connsiteY6" fmla="*/ 165696 h 5095933"/>
+              <a:gd name="connsiteX7" fmla="*/ 1347184 w 12192418"/>
+              <a:gd name="connsiteY7" fmla="*/ 201077 h 5095933"/>
+              <a:gd name="connsiteX8" fmla="*/ 1642223 w 12192418"/>
+              <a:gd name="connsiteY8" fmla="*/ 238560 h 5095933"/>
+              <a:gd name="connsiteX9" fmla="*/ 1962864 w 12192418"/>
+              <a:gd name="connsiteY9" fmla="*/ 276043 h 5095933"/>
+              <a:gd name="connsiteX10" fmla="*/ 2304232 w 12192418"/>
+              <a:gd name="connsiteY10" fmla="*/ 314227 h 5095933"/>
+              <a:gd name="connsiteX11" fmla="*/ 2672421 w 12192418"/>
+              <a:gd name="connsiteY11" fmla="*/ 349608 h 5095933"/>
+              <a:gd name="connsiteX12" fmla="*/ 3057678 w 12192418"/>
+              <a:gd name="connsiteY12" fmla="*/ 383588 h 5095933"/>
+              <a:gd name="connsiteX13" fmla="*/ 3464881 w 12192418"/>
+              <a:gd name="connsiteY13" fmla="*/ 414415 h 5095933"/>
+              <a:gd name="connsiteX14" fmla="*/ 3889152 w 12192418"/>
+              <a:gd name="connsiteY14" fmla="*/ 443841 h 5095933"/>
+              <a:gd name="connsiteX15" fmla="*/ 4331710 w 12192418"/>
+              <a:gd name="connsiteY15" fmla="*/ 471515 h 5095933"/>
+              <a:gd name="connsiteX16" fmla="*/ 4558476 w 12192418"/>
+              <a:gd name="connsiteY16" fmla="*/ 481324 h 5095933"/>
+              <a:gd name="connsiteX17" fmla="*/ 4790118 w 12192418"/>
+              <a:gd name="connsiteY17" fmla="*/ 492183 h 5095933"/>
+              <a:gd name="connsiteX18" fmla="*/ 5025418 w 12192418"/>
+              <a:gd name="connsiteY18" fmla="*/ 502342 h 5095933"/>
+              <a:gd name="connsiteX19" fmla="*/ 5261937 w 12192418"/>
+              <a:gd name="connsiteY19" fmla="*/ 508998 h 5095933"/>
+              <a:gd name="connsiteX20" fmla="*/ 5503332 w 12192418"/>
+              <a:gd name="connsiteY20" fmla="*/ 514953 h 5095933"/>
+              <a:gd name="connsiteX21" fmla="*/ 5747167 w 12192418"/>
+              <a:gd name="connsiteY21" fmla="*/ 521259 h 5095933"/>
+              <a:gd name="connsiteX22" fmla="*/ 5995877 w 12192418"/>
+              <a:gd name="connsiteY22" fmla="*/ 525463 h 5095933"/>
+              <a:gd name="connsiteX23" fmla="*/ 6247026 w 12192418"/>
+              <a:gd name="connsiteY23" fmla="*/ 525463 h 5095933"/>
+              <a:gd name="connsiteX24" fmla="*/ 6500613 w 12192418"/>
+              <a:gd name="connsiteY24" fmla="*/ 527565 h 5095933"/>
+              <a:gd name="connsiteX25" fmla="*/ 6756639 w 12192418"/>
+              <a:gd name="connsiteY25" fmla="*/ 525463 h 5095933"/>
+              <a:gd name="connsiteX26" fmla="*/ 7016322 w 12192418"/>
+              <a:gd name="connsiteY26" fmla="*/ 521259 h 5095933"/>
+              <a:gd name="connsiteX27" fmla="*/ 7276005 w 12192418"/>
+              <a:gd name="connsiteY27" fmla="*/ 517406 h 5095933"/>
+              <a:gd name="connsiteX28" fmla="*/ 7539345 w 12192418"/>
+              <a:gd name="connsiteY28" fmla="*/ 508998 h 5095933"/>
+              <a:gd name="connsiteX29" fmla="*/ 7805124 w 12192418"/>
+              <a:gd name="connsiteY29" fmla="*/ 500241 h 5095933"/>
+              <a:gd name="connsiteX30" fmla="*/ 8070903 w 12192418"/>
+              <a:gd name="connsiteY30" fmla="*/ 490082 h 5095933"/>
+              <a:gd name="connsiteX31" fmla="*/ 8339121 w 12192418"/>
+              <a:gd name="connsiteY31" fmla="*/ 475719 h 5095933"/>
+              <a:gd name="connsiteX32" fmla="*/ 8609776 w 12192418"/>
+              <a:gd name="connsiteY32" fmla="*/ 458554 h 5095933"/>
+              <a:gd name="connsiteX33" fmla="*/ 8881651 w 12192418"/>
+              <a:gd name="connsiteY33" fmla="*/ 442089 h 5095933"/>
+              <a:gd name="connsiteX34" fmla="*/ 9153526 w 12192418"/>
+              <a:gd name="connsiteY34" fmla="*/ 421071 h 5095933"/>
+              <a:gd name="connsiteX35" fmla="*/ 9429058 w 12192418"/>
+              <a:gd name="connsiteY35" fmla="*/ 395849 h 5095933"/>
+              <a:gd name="connsiteX36" fmla="*/ 9700933 w 12192418"/>
+              <a:gd name="connsiteY36" fmla="*/ 370626 h 5095933"/>
+              <a:gd name="connsiteX37" fmla="*/ 9977684 w 12192418"/>
+              <a:gd name="connsiteY37" fmla="*/ 341551 h 5095933"/>
+              <a:gd name="connsiteX38" fmla="*/ 10255655 w 12192418"/>
+              <a:gd name="connsiteY38" fmla="*/ 309673 h 5095933"/>
+              <a:gd name="connsiteX39" fmla="*/ 10529968 w 12192418"/>
+              <a:gd name="connsiteY39" fmla="*/ 276043 h 5095933"/>
+              <a:gd name="connsiteX40" fmla="*/ 10807939 w 12192418"/>
+              <a:gd name="connsiteY40" fmla="*/ 236809 h 5095933"/>
+              <a:gd name="connsiteX41" fmla="*/ 11084690 w 12192418"/>
+              <a:gd name="connsiteY41" fmla="*/ 194772 h 5095933"/>
+              <a:gd name="connsiteX42" fmla="*/ 11362661 w 12192418"/>
+              <a:gd name="connsiteY42" fmla="*/ 153085 h 5095933"/>
+              <a:gd name="connsiteX43" fmla="*/ 11639412 w 12192418"/>
+              <a:gd name="connsiteY43" fmla="*/ 104392 h 5095933"/>
+              <a:gd name="connsiteX44" fmla="*/ 11914945 w 12192418"/>
+              <a:gd name="connsiteY44" fmla="*/ 54648 h 5095933"/>
+              <a:gd name="connsiteX45" fmla="*/ 12191696 w 12192418"/>
+              <a:gd name="connsiteY45" fmla="*/ 2452 h 5095933"/>
+              <a:gd name="connsiteX46" fmla="*/ 12191696 w 12192418"/>
+              <a:gd name="connsiteY46" fmla="*/ 2109542 h 5095933"/>
+              <a:gd name="connsiteX47" fmla="*/ 12191999 w 12192418"/>
+              <a:gd name="connsiteY47" fmla="*/ 2109542 h 5095933"/>
+              <a:gd name="connsiteX48" fmla="*/ 12191999 w 12192418"/>
+              <a:gd name="connsiteY48" fmla="*/ 2802467 h 5095933"/>
+              <a:gd name="connsiteX49" fmla="*/ 12192418 w 12192418"/>
+              <a:gd name="connsiteY49" fmla="*/ 2802467 h 5095933"/>
+              <a:gd name="connsiteX50" fmla="*/ 12192418 w 12192418"/>
+              <a:gd name="connsiteY50" fmla="*/ 5095933 h 5095933"/>
+              <a:gd name="connsiteX51" fmla="*/ 1 w 12192418"/>
+              <a:gd name="connsiteY51" fmla="*/ 5095933 h 5095933"/>
+              <a:gd name="connsiteX52" fmla="*/ 1 w 12192418"/>
+              <a:gd name="connsiteY52" fmla="*/ 4074529 h 5095933"/>
+              <a:gd name="connsiteX53" fmla="*/ 0 w 12192418"/>
+              <a:gd name="connsiteY53" fmla="*/ 4074529 h 5095933"/>
+              <a:gd name="connsiteX54" fmla="*/ 0 w 12192418"/>
+              <a:gd name="connsiteY54" fmla="*/ 2109542 h 5095933"/>
+              <a:gd name="connsiteX55" fmla="*/ 1 w 12192418"/>
+              <a:gd name="connsiteY55" fmla="*/ 2109542 h 5095933"/>
+            </a:gdLst>
+            <a:ahLst/>
+            <a:cxnLst>
+              <a:cxn ang="0">
+                <a:pos x="connsiteX0" y="connsiteY0"/>
+              </a:cxn>
+              <a:cxn ang="0">
+                <a:pos x="connsiteX1" y="connsiteY1"/>
+              </a:cxn>
+              <a:cxn ang="0">
+                <a:pos x="connsiteX2" y="connsiteY2"/>
+              </a:cxn>
+              <a:cxn ang="0">
+                <a:pos x="connsiteX3" y="connsiteY3"/>
+              </a:cxn>
+              <a:cxn ang="0">
+                <a:pos x="connsiteX4" y="connsiteY4"/>
+              </a:cxn>
+              <a:cxn ang="0">
+                <a:pos x="connsiteX5" y="connsiteY5"/>
+              </a:cxn>
+              <a:cxn ang="0">
+                <a:pos x="connsiteX6" y="connsiteY6"/>
+              </a:cxn>
+              <a:cxn ang="0">
+                <a:pos x="connsiteX7" y="connsiteY7"/>
+              </a:cxn>
+              <a:cxn ang="0">
+                <a:pos x="connsiteX8" y="connsiteY8"/>
+              </a:cxn>
+              <a:cxn ang="0">
+                <a:pos x="connsiteX9" y="connsiteY9"/>
+              </a:cxn>
+              <a:cxn ang="0">
+                <a:pos x="connsiteX10" y="connsiteY10"/>
+              </a:cxn>
+              <a:cxn ang="0">
+                <a:pos x="connsiteX11" y="connsiteY11"/>
+              </a:cxn>
+              <a:cxn ang="0">
+                <a:pos x="connsiteX12" y="connsiteY12"/>
+              </a:cxn>
+              <a:cxn ang="0">
+                <a:pos x="connsiteX13" y="connsiteY13"/>
+              </a:cxn>
+              <a:cxn ang="0">
+                <a:pos x="connsiteX14" y="connsiteY14"/>
+              </a:cxn>
+              <a:cxn ang="0">
+                <a:pos x="connsiteX15" y="connsiteY15"/>
+              </a:cxn>
+              <a:cxn ang="0">
+                <a:pos x="connsiteX16" y="connsiteY16"/>
+              </a:cxn>
+              <a:cxn ang="0">
+                <a:pos x="connsiteX17" y="connsiteY17"/>
+              </a:cxn>
+              <a:cxn ang="0">
+                <a:pos x="connsiteX18" y="connsiteY18"/>
+              </a:cxn>
+              <a:cxn ang="0">
+                <a:pos x="connsiteX19" y="connsiteY19"/>
+              </a:cxn>
+              <a:cxn ang="0">
+                <a:pos x="connsiteX20" y="connsiteY20"/>
+              </a:cxn>
+              <a:cxn ang="0">
+                <a:pos x="connsiteX21" y="connsiteY21"/>
+              </a:cxn>
+              <a:cxn ang="0">
+                <a:pos x="connsiteX22" y="connsiteY22"/>
+              </a:cxn>
+              <a:cxn ang="0">
+                <a:pos x="connsiteX23" y="connsiteY23"/>
+              </a:cxn>
+              <a:cxn ang="0">
+                <a:pos x="connsiteX24" y="connsiteY24"/>
+              </a:cxn>
+              <a:cxn ang="0">
+                <a:pos x="connsiteX25" y="connsiteY25"/>
+              </a:cxn>
+              <a:cxn ang="0">
+                <a:pos x="connsiteX26" y="connsiteY26"/>
+              </a:cxn>
+              <a:cxn ang="0">
+                <a:pos x="connsiteX27" y="connsiteY27"/>
+              </a:cxn>
+              <a:cxn ang="0">
+                <a:pos x="connsiteX28" y="connsiteY28"/>
+              </a:cxn>
+              <a:cxn ang="0">
+                <a:pos x="connsiteX29" y="connsiteY29"/>
+              </a:cxn>
+              <a:cxn ang="0">
+                <a:pos x="connsiteX30" y="connsiteY30"/>
+              </a:cxn>
+              <a:cxn ang="0">
+                <a:pos x="connsiteX31" y="connsiteY31"/>
+              </a:cxn>
+              <a:cxn ang="0">
+                <a:pos x="connsiteX32" y="connsiteY32"/>
+              </a:cxn>
+              <a:cxn ang="0">
+                <a:pos x="connsiteX33" y="connsiteY33"/>
+              </a:cxn>
+              <a:cxn ang="0">
+                <a:pos x="connsiteX34" y="connsiteY34"/>
+              </a:cxn>
+              <a:cxn ang="0">
+                <a:pos x="connsiteX35" y="connsiteY35"/>
+              </a:cxn>
+              <a:cxn ang="0">
+                <a:pos x="connsiteX36" y="connsiteY36"/>
+              </a:cxn>
+              <a:cxn ang="0">
+                <a:pos x="connsiteX37" y="connsiteY37"/>
+              </a:cxn>
+              <a:cxn ang="0">
+                <a:pos x="connsiteX38" y="connsiteY38"/>
+              </a:cxn>
+              <a:cxn ang="0">
+                <a:pos x="connsiteX39" y="connsiteY39"/>
+              </a:cxn>
+              <a:cxn ang="0">
+                <a:pos x="connsiteX40" y="connsiteY40"/>
+              </a:cxn>
+              <a:cxn ang="0">
+                <a:pos x="connsiteX41" y="connsiteY41"/>
+              </a:cxn>
+              <a:cxn ang="0">
+                <a:pos x="connsiteX42" y="connsiteY42"/>
+              </a:cxn>
+              <a:cxn ang="0">
+                <a:pos x="connsiteX43" y="connsiteY43"/>
+              </a:cxn>
+              <a:cxn ang="0">
+                <a:pos x="connsiteX44" y="connsiteY44"/>
+              </a:cxn>
+              <a:cxn ang="0">
+                <a:pos x="connsiteX45" y="connsiteY45"/>
+              </a:cxn>
+              <a:cxn ang="0">
+                <a:pos x="connsiteX46" y="connsiteY46"/>
+              </a:cxn>
+              <a:cxn ang="0">
+                <a:pos x="connsiteX47" y="connsiteY47"/>
+              </a:cxn>
+              <a:cxn ang="0">
+                <a:pos x="connsiteX48" y="connsiteY48"/>
+              </a:cxn>
+              <a:cxn ang="0">
+                <a:pos x="connsiteX49" y="connsiteY49"/>
+              </a:cxn>
+              <a:cxn ang="0">
+                <a:pos x="connsiteX50" y="connsiteY50"/>
+              </a:cxn>
+              <a:cxn ang="0">
+                <a:pos x="connsiteX51" y="connsiteY51"/>
+              </a:cxn>
+              <a:cxn ang="0">
+                <a:pos x="connsiteX52" y="connsiteY52"/>
+              </a:cxn>
+              <a:cxn ang="0">
+                <a:pos x="connsiteX53" y="connsiteY53"/>
+              </a:cxn>
+              <a:cxn ang="0">
+                <a:pos x="connsiteX54" y="connsiteY54"/>
+              </a:cxn>
+              <a:cxn ang="0">
+                <a:pos x="connsiteX55" y="connsiteY55"/>
+              </a:cxn>
+            </a:cxnLst>
+            <a:rect l="l" t="t" r="r" b="b"/>
+            <a:pathLst>
+              <a:path w="12192418" h="5095933">
+                <a:moveTo>
+                  <a:pt x="1" y="0"/>
+                </a:moveTo>
+                <a:lnTo>
+                  <a:pt x="71932" y="12261"/>
+                </a:lnTo>
+                <a:lnTo>
+                  <a:pt x="282849" y="48343"/>
+                </a:lnTo>
+                <a:lnTo>
+                  <a:pt x="436464" y="73565"/>
+                </a:lnTo>
+                <a:lnTo>
+                  <a:pt x="619339" y="100188"/>
+                </a:lnTo>
+                <a:lnTo>
+                  <a:pt x="836351" y="132066"/>
+                </a:lnTo>
+                <a:lnTo>
+                  <a:pt x="1076528" y="165696"/>
+                </a:lnTo>
+                <a:lnTo>
+                  <a:pt x="1347184" y="201077"/>
+                </a:lnTo>
+                <a:lnTo>
+                  <a:pt x="1642223" y="238560"/>
+                </a:lnTo>
+                <a:lnTo>
+                  <a:pt x="1962864" y="276043"/>
+                </a:lnTo>
+                <a:lnTo>
+                  <a:pt x="2304232" y="314227"/>
+                </a:lnTo>
+                <a:lnTo>
+                  <a:pt x="2672421" y="349608"/>
+                </a:lnTo>
+                <a:lnTo>
+                  <a:pt x="3057678" y="383588"/>
+                </a:lnTo>
+                <a:lnTo>
+                  <a:pt x="3464881" y="414415"/>
+                </a:lnTo>
+                <a:lnTo>
+                  <a:pt x="3889152" y="443841"/>
+                </a:lnTo>
+                <a:lnTo>
+                  <a:pt x="4331710" y="471515"/>
+                </a:lnTo>
+                <a:lnTo>
+                  <a:pt x="4558476" y="481324"/>
+                </a:lnTo>
+                <a:lnTo>
+                  <a:pt x="4790118" y="492183"/>
+                </a:lnTo>
+                <a:lnTo>
+                  <a:pt x="5025418" y="502342"/>
+                </a:lnTo>
+                <a:lnTo>
+                  <a:pt x="5261937" y="508998"/>
+                </a:lnTo>
+                <a:lnTo>
+                  <a:pt x="5503332" y="514953"/>
+                </a:lnTo>
+                <a:lnTo>
+                  <a:pt x="5747167" y="521259"/>
+                </a:lnTo>
+                <a:lnTo>
+                  <a:pt x="5995877" y="525463"/>
+                </a:lnTo>
+                <a:lnTo>
+                  <a:pt x="6247026" y="525463"/>
+                </a:lnTo>
+                <a:lnTo>
+                  <a:pt x="6500613" y="527565"/>
+                </a:lnTo>
+                <a:lnTo>
+                  <a:pt x="6756639" y="525463"/>
+                </a:lnTo>
+                <a:lnTo>
+                  <a:pt x="7016322" y="521259"/>
+                </a:lnTo>
+                <a:lnTo>
+                  <a:pt x="7276005" y="517406"/>
+                </a:lnTo>
+                <a:lnTo>
+                  <a:pt x="7539345" y="508998"/>
+                </a:lnTo>
+                <a:lnTo>
+                  <a:pt x="7805124" y="500241"/>
+                </a:lnTo>
+                <a:lnTo>
+                  <a:pt x="8070903" y="490082"/>
+                </a:lnTo>
+                <a:lnTo>
+                  <a:pt x="8339121" y="475719"/>
+                </a:lnTo>
+                <a:lnTo>
+                  <a:pt x="8609776" y="458554"/>
+                </a:lnTo>
+                <a:lnTo>
+                  <a:pt x="8881651" y="442089"/>
+                </a:lnTo>
+                <a:lnTo>
+                  <a:pt x="9153526" y="421071"/>
+                </a:lnTo>
+                <a:lnTo>
+                  <a:pt x="9429058" y="395849"/>
+                </a:lnTo>
+                <a:lnTo>
+                  <a:pt x="9700933" y="370626"/>
+                </a:lnTo>
+                <a:lnTo>
+                  <a:pt x="9977684" y="341551"/>
+                </a:lnTo>
+                <a:lnTo>
+                  <a:pt x="10255655" y="309673"/>
+                </a:lnTo>
+                <a:lnTo>
+                  <a:pt x="10529968" y="276043"/>
+                </a:lnTo>
+                <a:lnTo>
+                  <a:pt x="10807939" y="236809"/>
+                </a:lnTo>
+                <a:lnTo>
+                  <a:pt x="11084690" y="194772"/>
+                </a:lnTo>
+                <a:lnTo>
+                  <a:pt x="11362661" y="153085"/>
+                </a:lnTo>
+                <a:lnTo>
+                  <a:pt x="11639412" y="104392"/>
+                </a:lnTo>
+                <a:lnTo>
+                  <a:pt x="11914945" y="54648"/>
+                </a:lnTo>
+                <a:lnTo>
+                  <a:pt x="12191696" y="2452"/>
+                </a:lnTo>
+                <a:lnTo>
+                  <a:pt x="12191696" y="2109542"/>
+                </a:lnTo>
+                <a:lnTo>
+                  <a:pt x="12191999" y="2109542"/>
+                </a:lnTo>
+                <a:lnTo>
+                  <a:pt x="12191999" y="2802467"/>
+                </a:lnTo>
+                <a:lnTo>
+                  <a:pt x="12192418" y="2802467"/>
+                </a:lnTo>
+                <a:lnTo>
+                  <a:pt x="12192418" y="5095933"/>
+                </a:lnTo>
+                <a:lnTo>
+                  <a:pt x="1" y="5095933"/>
+                </a:lnTo>
+                <a:lnTo>
+                  <a:pt x="1" y="4074529"/>
+                </a:lnTo>
+                <a:lnTo>
+                  <a:pt x="0" y="4074529"/>
+                </a:lnTo>
+                <a:lnTo>
+                  <a:pt x="0" y="2109542"/>
+                </a:lnTo>
+                <a:lnTo>
+                  <a:pt x="1" y="2109542"/>
+                </a:lnTo>
+                <a:close/>
+              </a:path>
+            </a:pathLst>
+          </a:custGeom>
+          <a:solidFill>
+            <a:schemeClr val="bg1"/>
+          </a:solidFill>
+          <a:ln>
+            <a:noFill/>
+          </a:ln>
+        </p:spPr>
+      </p:sp>
+      <p:graphicFrame>
+        <p:nvGraphicFramePr>
+          <p:cNvPr id="23" name="Content Placeholder 2">
+            <a:extLst>
+              <a:ext uri="{FF2B5EF4-FFF2-40B4-BE49-F238E27FC236}">
+                <a16:creationId xmlns:a16="http://schemas.microsoft.com/office/drawing/2014/main" id="{673C4480-3B1C-4891-87DA-DFB74576E73B}"/>
+              </a:ext>
+            </a:extLst>
+          </p:cNvPr>
+          <p:cNvGraphicFramePr>
+            <a:graphicFrameLocks noGrp="1"/>
+          </p:cNvGraphicFramePr>
+          <p:nvPr>
+            <p:ph idx="1"/>
+            <p:extLst>
+              <p:ext uri="{D42A27DB-BD31-4B8C-83A1-F6EECF244321}">
+                <p14:modId xmlns:p14="http://schemas.microsoft.com/office/powerpoint/2010/main" val="449505714"/>
+              </p:ext>
+            </p:extLst>
+          </p:nvPr>
+        </p:nvGraphicFramePr>
+        <p:xfrm>
+          <a:off x="648930" y="2810256"/>
+          <a:ext cx="10895370" cy="3404277"/>
+        </p:xfrm>
+        <a:graphic>
+          <a:graphicData uri="http://schemas.openxmlformats.org/drawingml/2006/diagram">
+            <dgm:relIds xmlns:dgm="http://schemas.openxmlformats.org/drawingml/2006/diagram" xmlns:r="http://schemas.openxmlformats.org/officeDocument/2006/relationships" r:dm="rId2" r:lo="rId3" r:qs="rId4" r:cs="rId5"/>
+          </a:graphicData>
+        </a:graphic>
+      </p:graphicFrame>
+    </p:spTree>
+    <p:extLst>
+      <p:ext uri="{BB962C8B-B14F-4D97-AF65-F5344CB8AC3E}">
+        <p14:creationId xmlns:p14="http://schemas.microsoft.com/office/powerpoint/2010/main" val="3579712629"/>
+      </p:ext>
+    </p:extLst>
+  </p:cSld>
+  <p:clrMapOvr>
+    <a:overrideClrMapping bg1="lt1" tx1="dk1" bg2="lt2" tx2="dk2" accent1="accent1" accent2="accent2" accent3="accent3" accent4="accent4" accent5="accent5" accent6="accent6" hlink="hlink" folHlink="folHlink"/>
   </p:clrMapOvr>
 </p:sld>
 </file>
@@ -16478,7 +18100,7 @@
             <a:picLocks noGrp="1" noChangeAspect="1"/>
           </p:cNvPicPr>
           <p:nvPr>
-            <p:ph idx="1"/>
+            <p:ph sz="half" idx="1"/>
           </p:nvPr>
         </p:nvPicPr>
         <p:blipFill>
@@ -16495,11 +18117,98 @@
         </p:blipFill>
         <p:spPr>
           <a:xfrm>
-            <a:off x="6255078" y="2054578"/>
-            <a:ext cx="5449887" cy="3729088"/>
+            <a:off x="6374296" y="1853248"/>
+            <a:ext cx="5459344" cy="4200245"/>
           </a:xfrm>
         </p:spPr>
       </p:pic>
+      <p:sp>
+        <p:nvSpPr>
+          <p:cNvPr id="4" name="Content Placeholder 3">
+            <a:extLst>
+              <a:ext uri="{FF2B5EF4-FFF2-40B4-BE49-F238E27FC236}">
+                <a16:creationId xmlns:a16="http://schemas.microsoft.com/office/drawing/2014/main" id="{D0E81EA2-E70C-466F-BF81-947E07971B5F}"/>
+              </a:ext>
+            </a:extLst>
+          </p:cNvPr>
+          <p:cNvSpPr>
+            <a:spLocks noGrp="1"/>
+          </p:cNvSpPr>
+          <p:nvPr>
+            <p:ph sz="half" idx="2"/>
+          </p:nvPr>
+        </p:nvSpPr>
+        <p:spPr>
+          <a:xfrm>
+            <a:off x="646111" y="1853248"/>
+            <a:ext cx="4396341" cy="4200245"/>
+          </a:xfrm>
+        </p:spPr>
+        <p:txBody>
+          <a:bodyPr/>
+          <a:lstStyle/>
+          <a:p>
+            <a:pPr marL="0" indent="0">
+              <a:buNone/>
+            </a:pPr>
+            <a:r>
+              <a:rPr lang="en-US" b="1" dirty="0"/>
+              <a:t>Pros</a:t>
+            </a:r>
+          </a:p>
+          <a:p>
+            <a:r>
+              <a:rPr lang="en-US" dirty="0"/>
+              <a:t>Industry standard software.</a:t>
+            </a:r>
+          </a:p>
+          <a:p>
+            <a:r>
+              <a:rPr lang="en-US" dirty="0"/>
+              <a:t>Powerful and flexible</a:t>
+            </a:r>
+          </a:p>
+          <a:p>
+            <a:r>
+              <a:rPr lang="en-US" dirty="0"/>
+              <a:t>Supported by massive community</a:t>
+            </a:r>
+          </a:p>
+          <a:p>
+            <a:r>
+              <a:rPr lang="en-US" dirty="0"/>
+              <a:t>One of the most thoroughly documented engines</a:t>
+            </a:r>
+          </a:p>
+          <a:p>
+            <a:pPr marL="0" indent="0">
+              <a:buNone/>
+            </a:pPr>
+            <a:r>
+              <a:rPr lang="en-US" b="1" dirty="0"/>
+              <a:t>Cons</a:t>
+            </a:r>
+          </a:p>
+          <a:p>
+            <a:r>
+              <a:rPr lang="en-US" dirty="0"/>
+              <a:t>Difficult for beginners</a:t>
+            </a:r>
+          </a:p>
+          <a:p>
+            <a:r>
+              <a:rPr lang="en-US" dirty="0"/>
+              <a:t>UI tools can be unintuitive</a:t>
+            </a:r>
+          </a:p>
+          <a:p>
+            <a:r>
+              <a:rPr lang="en-US" dirty="0"/>
+              <a:t>Can occasionally be pretty buggy</a:t>
+            </a:r>
+          </a:p>
+        </p:txBody>
+      </p:sp>
     </p:spTree>
     <p:extLst>
       <p:ext uri="{BB962C8B-B14F-4D97-AF65-F5344CB8AC3E}">
@@ -16535,7 +18244,7 @@
           <p:cNvPr id="2" name="Title 1">
             <a:extLst>
               <a:ext uri="{FF2B5EF4-FFF2-40B4-BE49-F238E27FC236}">
-                <a16:creationId xmlns:a16="http://schemas.microsoft.com/office/drawing/2014/main" id="{96BEB878-A33E-4672-B69F-C76DCE9DFB83}"/>
+                <a16:creationId xmlns:a16="http://schemas.microsoft.com/office/drawing/2014/main" id="{C5523406-C399-4378-AC03-5BEC55494AB0}"/>
               </a:ext>
             </a:extLst>
           </p:cNvPr>
@@ -16553,17 +18262,52 @@
           <a:p>
             <a:r>
               <a:rPr lang="en-US" dirty="0"/>
-              <a:t>The Indie Economy</a:t>
+              <a:t>Unreal</a:t>
             </a:r>
           </a:p>
         </p:txBody>
       </p:sp>
+      <p:pic>
+        <p:nvPicPr>
+          <p:cNvPr id="6" name="Content Placeholder 5">
+            <a:extLst>
+              <a:ext uri="{FF2B5EF4-FFF2-40B4-BE49-F238E27FC236}">
+                <a16:creationId xmlns:a16="http://schemas.microsoft.com/office/drawing/2014/main" id="{F463E249-0094-4900-B436-94F50A911156}"/>
+              </a:ext>
+            </a:extLst>
+          </p:cNvPr>
+          <p:cNvPicPr>
+            <a:picLocks noGrp="1" noChangeAspect="1"/>
+          </p:cNvPicPr>
+          <p:nvPr>
+            <p:ph sz="half" idx="1"/>
+          </p:nvPr>
+        </p:nvPicPr>
+        <p:blipFill>
+          <a:blip r:embed="rId2">
+            <a:extLst>
+              <a:ext uri="{28A0092B-C50C-407E-A947-70E740481C1C}">
+                <a14:useLocalDpi xmlns:a14="http://schemas.microsoft.com/office/drawing/2010/main" val="0"/>
+              </a:ext>
+            </a:extLst>
+          </a:blip>
+          <a:stretch>
+            <a:fillRect/>
+          </a:stretch>
+        </p:blipFill>
+        <p:spPr>
+          <a:xfrm>
+            <a:off x="6374296" y="2327889"/>
+            <a:ext cx="5459344" cy="3250963"/>
+          </a:xfrm>
+        </p:spPr>
+      </p:pic>
       <p:sp>
         <p:nvSpPr>
-          <p:cNvPr id="3" name="Content Placeholder 2">
+          <p:cNvPr id="4" name="Content Placeholder 3">
             <a:extLst>
               <a:ext uri="{FF2B5EF4-FFF2-40B4-BE49-F238E27FC236}">
-                <a16:creationId xmlns:a16="http://schemas.microsoft.com/office/drawing/2014/main" id="{87F1C4CA-2D5C-403A-8FBC-2930A10CA764}"/>
+                <a16:creationId xmlns:a16="http://schemas.microsoft.com/office/drawing/2014/main" id="{D0E81EA2-E70C-466F-BF81-947E07971B5F}"/>
               </a:ext>
             </a:extLst>
           </p:cNvPr>
@@ -16571,31 +18315,44 @@
             <a:spLocks noGrp="1"/>
           </p:cNvSpPr>
           <p:nvPr>
-            <p:ph idx="1"/>
+            <p:ph sz="half" idx="2"/>
           </p:nvPr>
         </p:nvSpPr>
-        <p:spPr/>
+        <p:spPr>
+          <a:xfrm>
+            <a:off x="646111" y="1853248"/>
+            <a:ext cx="4396341" cy="4200245"/>
+          </a:xfrm>
+        </p:spPr>
         <p:txBody>
           <a:bodyPr/>
           <a:lstStyle/>
           <a:p>
+            <a:pPr marL="0" indent="0">
+              <a:buNone/>
+            </a:pPr>
             <a:r>
-              <a:rPr lang="en-US" dirty="0"/>
-              <a:t>Golden rule of independent game design – If you spend money to make a game, you’ve lost money.</a:t>
+              <a:rPr lang="en-US" b="1" dirty="0"/>
+              <a:t>Pros</a:t>
             </a:r>
-          </a:p>
-          <a:p>
+            <a:endParaRPr lang="en-US" dirty="0"/>
+          </a:p>
+          <a:p>
+            <a:pPr marL="0" indent="0">
+              <a:buNone/>
+            </a:pPr>
             <a:r>
-              <a:rPr lang="en-US" dirty="0"/>
-              <a:t>There is a lot of money in the scene, just not for any of us.</a:t>
+              <a:rPr lang="en-US" b="1" dirty="0"/>
+              <a:t>Cons</a:t>
             </a:r>
+            <a:endParaRPr lang="en-US" dirty="0"/>
           </a:p>
         </p:txBody>
       </p:sp>
     </p:spTree>
     <p:extLst>
       <p:ext uri="{BB962C8B-B14F-4D97-AF65-F5344CB8AC3E}">
-        <p14:creationId xmlns:p14="http://schemas.microsoft.com/office/powerpoint/2010/main" val="1116587354"/>
+        <p14:creationId xmlns:p14="http://schemas.microsoft.com/office/powerpoint/2010/main" val="3094867396"/>
       </p:ext>
     </p:extLst>
   </p:cSld>
@@ -16608,14 +18365,6 @@
 <file path=ppt/slides/slide9.xml><?xml version="1.0" encoding="utf-8"?>
 <p:sld xmlns:a="http://schemas.openxmlformats.org/drawingml/2006/main" xmlns:r="http://schemas.openxmlformats.org/officeDocument/2006/relationships" xmlns:p="http://schemas.openxmlformats.org/presentationml/2006/main">
   <p:cSld>
-    <p:bg>
-      <p:bgPr>
-        <a:solidFill>
-          <a:schemeClr val="bg1"/>
-        </a:solidFill>
-        <a:effectLst/>
-      </p:bgPr>
-    </p:bg>
     <p:spTree>
       <p:nvGrpSpPr>
         <p:cNvPr id="1" name=""/>
@@ -16632,434 +18381,10 @@
       </p:grpSpPr>
       <p:sp>
         <p:nvSpPr>
-          <p:cNvPr id="28" name="Rectangle 27">
-            <a:extLst>
-              <a:ext uri="{FF2B5EF4-FFF2-40B4-BE49-F238E27FC236}">
-                <a16:creationId xmlns:a16="http://schemas.microsoft.com/office/drawing/2014/main" id="{F747F1B4-B831-4277-8AB0-32767F7EB7BF}"/>
-              </a:ext>
-              <a:ext uri="{C183D7F6-B498-43B3-948B-1728B52AA6E4}">
-                <adec:decorative xmlns:adec="http://schemas.microsoft.com/office/drawing/2017/decorative" val="1"/>
-              </a:ext>
-            </a:extLst>
-          </p:cNvPr>
-          <p:cNvSpPr>
-            <a:spLocks noGrp="1" noRot="1" noChangeAspect="1" noMove="1" noResize="1" noEditPoints="1" noAdjustHandles="1" noChangeArrowheads="1" noChangeShapeType="1" noTextEdit="1"/>
-          </p:cNvSpPr>
-          <p:nvPr>
-            <p:extLst>
-              <p:ext uri="{386F3935-93C4-4BCD-93E2-E3B085C9AB24}">
-                <p16:designElem xmlns:p16="http://schemas.microsoft.com/office/powerpoint/2015/main" val="1"/>
-              </p:ext>
-            </p:extLst>
-          </p:nvPr>
-        </p:nvSpPr>
-        <p:spPr>
-          <a:xfrm>
-            <a:off x="0" y="0"/>
-            <a:ext cx="12191999" cy="6858000"/>
-          </a:xfrm>
-          <a:prstGeom prst="rect">
-            <a:avLst/>
-          </a:prstGeom>
-          <a:ln>
-            <a:noFill/>
-          </a:ln>
-        </p:spPr>
-        <p:style>
-          <a:lnRef idx="2">
-            <a:schemeClr val="accent1">
-              <a:shade val="50000"/>
-            </a:schemeClr>
-          </a:lnRef>
-          <a:fillRef idx="1003">
-            <a:schemeClr val="dk2"/>
-          </a:fillRef>
-          <a:effectRef idx="0">
-            <a:schemeClr val="accent1"/>
-          </a:effectRef>
-          <a:fontRef idx="minor">
-            <a:schemeClr val="lt1"/>
-          </a:fontRef>
-        </p:style>
-        <p:txBody>
-          <a:bodyPr rtlCol="0" anchor="ctr"/>
-          <a:lstStyle/>
-          <a:p>
-            <a:pPr algn="ctr"/>
-            <a:endParaRPr lang="en-US"/>
-          </a:p>
-        </p:txBody>
-      </p:sp>
-      <p:sp>
-        <p:nvSpPr>
-          <p:cNvPr id="30" name="Freeform 7">
-            <a:extLst>
-              <a:ext uri="{FF2B5EF4-FFF2-40B4-BE49-F238E27FC236}">
-                <a16:creationId xmlns:a16="http://schemas.microsoft.com/office/drawing/2014/main" id="{D80CFA21-AB7C-4BEB-9BFF-05764FBBF3C6}"/>
-              </a:ext>
-              <a:ext uri="{C183D7F6-B498-43B3-948B-1728B52AA6E4}">
-                <adec:decorative xmlns:adec="http://schemas.microsoft.com/office/drawing/2017/decorative" val="1"/>
-              </a:ext>
-            </a:extLst>
-          </p:cNvPr>
-          <p:cNvSpPr>
-            <a:spLocks noGrp="1" noRot="1" noChangeAspect="1" noMove="1" noResize="1" noEditPoints="1" noAdjustHandles="1" noChangeArrowheads="1" noChangeShapeType="1" noTextEdit="1"/>
-          </p:cNvSpPr>
-          <p:nvPr>
-            <p:extLst>
-              <p:ext uri="{386F3935-93C4-4BCD-93E2-E3B085C9AB24}">
-                <p16:designElem xmlns:p16="http://schemas.microsoft.com/office/powerpoint/2015/main" val="1"/>
-              </p:ext>
-            </p:extLst>
-          </p:nvPr>
-        </p:nvSpPr>
-        <p:spPr>
-          <a:xfrm>
-            <a:off x="8719939" y="1460230"/>
-            <a:ext cx="3472060" cy="825932"/>
-          </a:xfrm>
-          <a:custGeom>
-            <a:avLst/>
-            <a:gdLst>
-              <a:gd name="connsiteX0" fmla="*/ 3470310 w 3472060"/>
-              <a:gd name="connsiteY0" fmla="*/ 0 h 825932"/>
-              <a:gd name="connsiteX1" fmla="*/ 3472060 w 3472060"/>
-              <a:gd name="connsiteY1" fmla="*/ 12850 h 825932"/>
-              <a:gd name="connsiteX2" fmla="*/ 3472060 w 3472060"/>
-              <a:gd name="connsiteY2" fmla="*/ 480529 h 825932"/>
-              <a:gd name="connsiteX3" fmla="*/ 3363699 w 3472060"/>
-              <a:gd name="connsiteY3" fmla="*/ 498471 h 825932"/>
-              <a:gd name="connsiteX4" fmla="*/ 42060 w 3472060"/>
-              <a:gd name="connsiteY4" fmla="*/ 824486 h 825932"/>
-              <a:gd name="connsiteX5" fmla="*/ 0 w 3472060"/>
-              <a:gd name="connsiteY5" fmla="*/ 758452 h 825932"/>
-              <a:gd name="connsiteX6" fmla="*/ 188014 w 3472060"/>
-              <a:gd name="connsiteY6" fmla="*/ 735602 h 825932"/>
-              <a:gd name="connsiteX7" fmla="*/ 284087 w 3472060"/>
-              <a:gd name="connsiteY7" fmla="*/ 722590 h 825932"/>
-              <a:gd name="connsiteX8" fmla="*/ 382288 w 3472060"/>
-              <a:gd name="connsiteY8" fmla="*/ 709392 h 825932"/>
-              <a:gd name="connsiteX9" fmla="*/ 481858 w 3472060"/>
-              <a:gd name="connsiteY9" fmla="*/ 695774 h 825932"/>
-              <a:gd name="connsiteX10" fmla="*/ 581897 w 3472060"/>
-              <a:gd name="connsiteY10" fmla="*/ 680711 h 825932"/>
-              <a:gd name="connsiteX11" fmla="*/ 683670 w 3472060"/>
-              <a:gd name="connsiteY11" fmla="*/ 665256 h 825932"/>
-              <a:gd name="connsiteX12" fmla="*/ 787206 w 3472060"/>
-              <a:gd name="connsiteY12" fmla="*/ 649587 h 825932"/>
-              <a:gd name="connsiteX13" fmla="*/ 892019 w 3472060"/>
-              <a:gd name="connsiteY13" fmla="*/ 632968 h 825932"/>
-              <a:gd name="connsiteX14" fmla="*/ 997620 w 3472060"/>
-              <a:gd name="connsiteY14" fmla="*/ 614667 h 825932"/>
-              <a:gd name="connsiteX15" fmla="*/ 1104727 w 3472060"/>
-              <a:gd name="connsiteY15" fmla="*/ 596741 h 825932"/>
-              <a:gd name="connsiteX16" fmla="*/ 1212669 w 3472060"/>
-              <a:gd name="connsiteY16" fmla="*/ 577397 h 825932"/>
-              <a:gd name="connsiteX17" fmla="*/ 1321506 w 3472060"/>
-              <a:gd name="connsiteY17" fmla="*/ 556988 h 825932"/>
-              <a:gd name="connsiteX18" fmla="*/ 1430709 w 3472060"/>
-              <a:gd name="connsiteY18" fmla="*/ 536607 h 825932"/>
-              <a:gd name="connsiteX19" fmla="*/ 1541050 w 3472060"/>
-              <a:gd name="connsiteY19" fmla="*/ 514481 h 825932"/>
-              <a:gd name="connsiteX20" fmla="*/ 1652805 w 3472060"/>
-              <a:gd name="connsiteY20" fmla="*/ 492202 h 825932"/>
-              <a:gd name="connsiteX21" fmla="*/ 1763708 w 3472060"/>
-              <a:gd name="connsiteY21" fmla="*/ 469161 h 825932"/>
-              <a:gd name="connsiteX22" fmla="*/ 1875795 w 3472060"/>
-              <a:gd name="connsiteY22" fmla="*/ 444641 h 825932"/>
-              <a:gd name="connsiteX23" fmla="*/ 1989128 w 3472060"/>
-              <a:gd name="connsiteY23" fmla="*/ 418995 h 825932"/>
-              <a:gd name="connsiteX24" fmla="*/ 2102476 w 3472060"/>
-              <a:gd name="connsiteY24" fmla="*/ 393438 h 825932"/>
-              <a:gd name="connsiteX25" fmla="*/ 2215549 w 3472060"/>
-              <a:gd name="connsiteY25" fmla="*/ 366291 h 825932"/>
-              <a:gd name="connsiteX26" fmla="*/ 2330490 w 3472060"/>
-              <a:gd name="connsiteY26" fmla="*/ 337455 h 825932"/>
-              <a:gd name="connsiteX27" fmla="*/ 2443333 w 3472060"/>
-              <a:gd name="connsiteY27" fmla="*/ 308983 h 825932"/>
-              <a:gd name="connsiteX28" fmla="*/ 2558014 w 3472060"/>
-              <a:gd name="connsiteY28" fmla="*/ 278646 h 825932"/>
-              <a:gd name="connsiteX29" fmla="*/ 2673621 w 3472060"/>
-              <a:gd name="connsiteY29" fmla="*/ 247421 h 825932"/>
-              <a:gd name="connsiteX30" fmla="*/ 2787008 w 3472060"/>
-              <a:gd name="connsiteY30" fmla="*/ 215853 h 825932"/>
-              <a:gd name="connsiteX31" fmla="*/ 2901442 w 3472060"/>
-              <a:gd name="connsiteY31" fmla="*/ 182011 h 825932"/>
-              <a:gd name="connsiteX32" fmla="*/ 3015722 w 3472060"/>
-              <a:gd name="connsiteY32" fmla="*/ 147286 h 825932"/>
-              <a:gd name="connsiteX33" fmla="*/ 3130018 w 3472060"/>
-              <a:gd name="connsiteY33" fmla="*/ 112649 h 825932"/>
-              <a:gd name="connsiteX34" fmla="*/ 3243551 w 3472060"/>
-              <a:gd name="connsiteY34" fmla="*/ 75688 h 825932"/>
-              <a:gd name="connsiteX35" fmla="*/ 3356992 w 3472060"/>
-              <a:gd name="connsiteY35" fmla="*/ 38197 h 825932"/>
-              <a:gd name="connsiteX36" fmla="*/ 3470310 w 3472060"/>
-              <a:gd name="connsiteY36" fmla="*/ 0 h 825932"/>
-            </a:gdLst>
-            <a:ahLst/>
-            <a:cxnLst>
-              <a:cxn ang="0">
-                <a:pos x="connsiteX0" y="connsiteY0"/>
-              </a:cxn>
-              <a:cxn ang="0">
-                <a:pos x="connsiteX1" y="connsiteY1"/>
-              </a:cxn>
-              <a:cxn ang="0">
-                <a:pos x="connsiteX2" y="connsiteY2"/>
-              </a:cxn>
-              <a:cxn ang="0">
-                <a:pos x="connsiteX3" y="connsiteY3"/>
-              </a:cxn>
-              <a:cxn ang="0">
-                <a:pos x="connsiteX4" y="connsiteY4"/>
-              </a:cxn>
-              <a:cxn ang="0">
-                <a:pos x="connsiteX5" y="connsiteY5"/>
-              </a:cxn>
-              <a:cxn ang="0">
-                <a:pos x="connsiteX6" y="connsiteY6"/>
-              </a:cxn>
-              <a:cxn ang="0">
-                <a:pos x="connsiteX7" y="connsiteY7"/>
-              </a:cxn>
-              <a:cxn ang="0">
-                <a:pos x="connsiteX8" y="connsiteY8"/>
-              </a:cxn>
-              <a:cxn ang="0">
-                <a:pos x="connsiteX9" y="connsiteY9"/>
-              </a:cxn>
-              <a:cxn ang="0">
-                <a:pos x="connsiteX10" y="connsiteY10"/>
-              </a:cxn>
-              <a:cxn ang="0">
-                <a:pos x="connsiteX11" y="connsiteY11"/>
-              </a:cxn>
-              <a:cxn ang="0">
-                <a:pos x="connsiteX12" y="connsiteY12"/>
-              </a:cxn>
-              <a:cxn ang="0">
-                <a:pos x="connsiteX13" y="connsiteY13"/>
-              </a:cxn>
-              <a:cxn ang="0">
-                <a:pos x="connsiteX14" y="connsiteY14"/>
-              </a:cxn>
-              <a:cxn ang="0">
-                <a:pos x="connsiteX15" y="connsiteY15"/>
-              </a:cxn>
-              <a:cxn ang="0">
-                <a:pos x="connsiteX16" y="connsiteY16"/>
-              </a:cxn>
-              <a:cxn ang="0">
-                <a:pos x="connsiteX17" y="connsiteY17"/>
-              </a:cxn>
-              <a:cxn ang="0">
-                <a:pos x="connsiteX18" y="connsiteY18"/>
-              </a:cxn>
-              <a:cxn ang="0">
-                <a:pos x="connsiteX19" y="connsiteY19"/>
-              </a:cxn>
-              <a:cxn ang="0">
-                <a:pos x="connsiteX20" y="connsiteY20"/>
-              </a:cxn>
-              <a:cxn ang="0">
-                <a:pos x="connsiteX21" y="connsiteY21"/>
-              </a:cxn>
-              <a:cxn ang="0">
-                <a:pos x="connsiteX22" y="connsiteY22"/>
-              </a:cxn>
-              <a:cxn ang="0">
-                <a:pos x="connsiteX23" y="connsiteY23"/>
-              </a:cxn>
-              <a:cxn ang="0">
-                <a:pos x="connsiteX24" y="connsiteY24"/>
-              </a:cxn>
-              <a:cxn ang="0">
-                <a:pos x="connsiteX25" y="connsiteY25"/>
-              </a:cxn>
-              <a:cxn ang="0">
-                <a:pos x="connsiteX26" y="connsiteY26"/>
-              </a:cxn>
-              <a:cxn ang="0">
-                <a:pos x="connsiteX27" y="connsiteY27"/>
-              </a:cxn>
-              <a:cxn ang="0">
-                <a:pos x="connsiteX28" y="connsiteY28"/>
-              </a:cxn>
-              <a:cxn ang="0">
-                <a:pos x="connsiteX29" y="connsiteY29"/>
-              </a:cxn>
-              <a:cxn ang="0">
-                <a:pos x="connsiteX30" y="connsiteY30"/>
-              </a:cxn>
-              <a:cxn ang="0">
-                <a:pos x="connsiteX31" y="connsiteY31"/>
-              </a:cxn>
-              <a:cxn ang="0">
-                <a:pos x="connsiteX32" y="connsiteY32"/>
-              </a:cxn>
-              <a:cxn ang="0">
-                <a:pos x="connsiteX33" y="connsiteY33"/>
-              </a:cxn>
-              <a:cxn ang="0">
-                <a:pos x="connsiteX34" y="connsiteY34"/>
-              </a:cxn>
-              <a:cxn ang="0">
-                <a:pos x="connsiteX35" y="connsiteY35"/>
-              </a:cxn>
-              <a:cxn ang="0">
-                <a:pos x="connsiteX36" y="connsiteY36"/>
-              </a:cxn>
-            </a:cxnLst>
-            <a:rect l="l" t="t" r="r" b="b"/>
-            <a:pathLst>
-              <a:path w="3472060" h="825932">
-                <a:moveTo>
-                  <a:pt x="3470310" y="0"/>
-                </a:moveTo>
-                <a:lnTo>
-                  <a:pt x="3472060" y="12850"/>
-                </a:lnTo>
-                <a:lnTo>
-                  <a:pt x="3472060" y="480529"/>
-                </a:lnTo>
-                <a:lnTo>
-                  <a:pt x="3363699" y="498471"/>
-                </a:lnTo>
-                <a:cubicBezTo>
-                  <a:pt x="2435623" y="645518"/>
-                  <a:pt x="603076" y="844866"/>
-                  <a:pt x="42060" y="824486"/>
-                </a:cubicBezTo>
-                <a:cubicBezTo>
-                  <a:pt x="28151" y="802425"/>
-                  <a:pt x="13909" y="780513"/>
-                  <a:pt x="0" y="758452"/>
-                </a:cubicBezTo>
-                <a:lnTo>
-                  <a:pt x="188014" y="735602"/>
-                </a:lnTo>
-                <a:lnTo>
-                  <a:pt x="284087" y="722590"/>
-                </a:lnTo>
-                <a:lnTo>
-                  <a:pt x="382288" y="709392"/>
-                </a:lnTo>
-                <a:lnTo>
-                  <a:pt x="481858" y="695774"/>
-                </a:lnTo>
-                <a:lnTo>
-                  <a:pt x="581897" y="680711"/>
-                </a:lnTo>
-                <a:lnTo>
-                  <a:pt x="683670" y="665256"/>
-                </a:lnTo>
-                <a:lnTo>
-                  <a:pt x="787206" y="649587"/>
-                </a:lnTo>
-                <a:lnTo>
-                  <a:pt x="892019" y="632968"/>
-                </a:lnTo>
-                <a:lnTo>
-                  <a:pt x="997620" y="614667"/>
-                </a:lnTo>
-                <a:lnTo>
-                  <a:pt x="1104727" y="596741"/>
-                </a:lnTo>
-                <a:lnTo>
-                  <a:pt x="1212669" y="577397"/>
-                </a:lnTo>
-                <a:lnTo>
-                  <a:pt x="1321506" y="556988"/>
-                </a:lnTo>
-                <a:lnTo>
-                  <a:pt x="1430709" y="536607"/>
-                </a:lnTo>
-                <a:lnTo>
-                  <a:pt x="1541050" y="514481"/>
-                </a:lnTo>
-                <a:lnTo>
-                  <a:pt x="1652805" y="492202"/>
-                </a:lnTo>
-                <a:lnTo>
-                  <a:pt x="1763708" y="469161"/>
-                </a:lnTo>
-                <a:lnTo>
-                  <a:pt x="1875795" y="444641"/>
-                </a:lnTo>
-                <a:lnTo>
-                  <a:pt x="1989128" y="418995"/>
-                </a:lnTo>
-                <a:lnTo>
-                  <a:pt x="2102476" y="393438"/>
-                </a:lnTo>
-                <a:lnTo>
-                  <a:pt x="2215549" y="366291"/>
-                </a:lnTo>
-                <a:lnTo>
-                  <a:pt x="2330490" y="337455"/>
-                </a:lnTo>
-                <a:lnTo>
-                  <a:pt x="2443333" y="308983"/>
-                </a:lnTo>
-                <a:lnTo>
-                  <a:pt x="2558014" y="278646"/>
-                </a:lnTo>
-                <a:lnTo>
-                  <a:pt x="2673621" y="247421"/>
-                </a:lnTo>
-                <a:lnTo>
-                  <a:pt x="2787008" y="215853"/>
-                </a:lnTo>
-                <a:lnTo>
-                  <a:pt x="2901442" y="182011"/>
-                </a:lnTo>
-                <a:lnTo>
-                  <a:pt x="3015722" y="147286"/>
-                </a:lnTo>
-                <a:lnTo>
-                  <a:pt x="3130018" y="112649"/>
-                </a:lnTo>
-                <a:lnTo>
-                  <a:pt x="3243551" y="75688"/>
-                </a:lnTo>
-                <a:lnTo>
-                  <a:pt x="3356992" y="38197"/>
-                </a:lnTo>
-                <a:lnTo>
-                  <a:pt x="3470310" y="0"/>
-                </a:lnTo>
-                <a:close/>
-              </a:path>
-            </a:pathLst>
-          </a:custGeom>
-          <a:solidFill>
-            <a:schemeClr val="bg1">
-              <a:alpha val="20000"/>
-            </a:schemeClr>
-          </a:solidFill>
-          <a:ln>
-            <a:noFill/>
-          </a:ln>
-        </p:spPr>
-        <p:txBody>
-          <a:bodyPr rtlCol="0" anchor="ctr"/>
-          <a:lstStyle/>
-          <a:p>
-            <a:pPr algn="ctr"/>
-            <a:endParaRPr lang="en-US">
-              <a:solidFill>
-                <a:schemeClr val="tx1"/>
-              </a:solidFill>
-            </a:endParaRPr>
-          </a:p>
-        </p:txBody>
-      </p:sp>
-      <p:sp>
-        <p:nvSpPr>
           <p:cNvPr id="2" name="Title 1">
             <a:extLst>
               <a:ext uri="{FF2B5EF4-FFF2-40B4-BE49-F238E27FC236}">
-                <a16:creationId xmlns:a16="http://schemas.microsoft.com/office/drawing/2014/main" id="{58468BC1-1002-4552-9E98-4818863C8BAB}"/>
+                <a16:creationId xmlns:a16="http://schemas.microsoft.com/office/drawing/2014/main" id="{C5523406-C399-4378-AC03-5BEC55494AB0}"/>
               </a:ext>
             </a:extLst>
           </p:cNvPr>
@@ -17070,620 +18395,139 @@
             <p:ph type="title"/>
           </p:nvPr>
         </p:nvSpPr>
+        <p:spPr/>
+        <p:txBody>
+          <a:bodyPr/>
+          <a:lstStyle/>
+          <a:p>
+            <a:r>
+              <a:rPr lang="en-US" dirty="0"/>
+              <a:t>Game Maker</a:t>
+            </a:r>
+          </a:p>
+        </p:txBody>
+      </p:sp>
+      <p:pic>
+        <p:nvPicPr>
+          <p:cNvPr id="6" name="Content Placeholder 5">
+            <a:extLst>
+              <a:ext uri="{FF2B5EF4-FFF2-40B4-BE49-F238E27FC236}">
+                <a16:creationId xmlns:a16="http://schemas.microsoft.com/office/drawing/2014/main" id="{F463E249-0094-4900-B436-94F50A911156}"/>
+              </a:ext>
+            </a:extLst>
+          </p:cNvPr>
+          <p:cNvPicPr>
+            <a:picLocks noGrp="1" noChangeAspect="1"/>
+          </p:cNvPicPr>
+          <p:nvPr>
+            <p:ph sz="half" idx="1"/>
+          </p:nvPr>
+        </p:nvPicPr>
+        <p:blipFill>
+          <a:blip r:embed="rId2">
+            <a:extLst>
+              <a:ext uri="{28A0092B-C50C-407E-A947-70E740481C1C}">
+                <a14:useLocalDpi xmlns:a14="http://schemas.microsoft.com/office/drawing/2010/main" val="0"/>
+              </a:ext>
+            </a:extLst>
+          </a:blip>
+          <a:stretch>
+            <a:fillRect/>
+          </a:stretch>
+        </p:blipFill>
         <p:spPr>
           <a:xfrm>
-            <a:off x="648930" y="629267"/>
-            <a:ext cx="9252154" cy="1016654"/>
+            <a:off x="6374296" y="2417930"/>
+            <a:ext cx="5459344" cy="3070881"/>
+          </a:xfrm>
+        </p:spPr>
+      </p:pic>
+      <p:sp>
+        <p:nvSpPr>
+          <p:cNvPr id="4" name="Content Placeholder 3">
+            <a:extLst>
+              <a:ext uri="{FF2B5EF4-FFF2-40B4-BE49-F238E27FC236}">
+                <a16:creationId xmlns:a16="http://schemas.microsoft.com/office/drawing/2014/main" id="{D0E81EA2-E70C-466F-BF81-947E07971B5F}"/>
+              </a:ext>
+            </a:extLst>
+          </p:cNvPr>
+          <p:cNvSpPr>
+            <a:spLocks noGrp="1"/>
+          </p:cNvSpPr>
+          <p:nvPr>
+            <p:ph sz="half" idx="2"/>
+          </p:nvPr>
+        </p:nvSpPr>
+        <p:spPr>
+          <a:xfrm>
+            <a:off x="646111" y="1853248"/>
+            <a:ext cx="4396341" cy="4269256"/>
           </a:xfrm>
         </p:spPr>
         <p:txBody>
           <a:bodyPr>
-            <a:normAutofit/>
+            <a:normAutofit lnSpcReduction="10000"/>
           </a:bodyPr>
           <a:lstStyle/>
           <a:p>
+            <a:pPr marL="0" indent="0">
+              <a:buNone/>
+            </a:pPr>
             <a:r>
-              <a:rPr lang="en-US">
-                <a:solidFill>
-                  <a:srgbClr val="EBEBEB"/>
-                </a:solidFill>
-              </a:rPr>
-              <a:t>Parting Advice</a:t>
+              <a:rPr lang="en-US" b="1" dirty="0"/>
+              <a:t>Pros</a:t>
+            </a:r>
+          </a:p>
+          <a:p>
+            <a:r>
+              <a:rPr lang="en-US" dirty="0"/>
+              <a:t>Easy for beginners</a:t>
+            </a:r>
+          </a:p>
+          <a:p>
+            <a:r>
+              <a:rPr lang="en-US" dirty="0"/>
+              <a:t>Robust visual scripting tools</a:t>
+            </a:r>
+          </a:p>
+          <a:p>
+            <a:r>
+              <a:rPr lang="en-US" dirty="0"/>
+              <a:t>If you buy it once, you have it forever. No additional licenses or royalties are necessary. </a:t>
+            </a:r>
+          </a:p>
+          <a:p>
+            <a:pPr marL="0" indent="0">
+              <a:buNone/>
+            </a:pPr>
+            <a:r>
+              <a:rPr lang="en-US" b="1" dirty="0"/>
+              <a:t>Cons</a:t>
+            </a:r>
+          </a:p>
+          <a:p>
+            <a:r>
+              <a:rPr lang="en-US" dirty="0"/>
+              <a:t>Unsuitable for 3D development</a:t>
+            </a:r>
+          </a:p>
+          <a:p>
+            <a:r>
+              <a:rPr lang="en-US" dirty="0"/>
+              <a:t>The more you learn, the more control you’ll want. The ease of use that makes it great for beginners can make it frustrating for advanced users.</a:t>
             </a:r>
           </a:p>
         </p:txBody>
       </p:sp>
-      <p:sp>
-        <p:nvSpPr>
-          <p:cNvPr id="32" name="Rectangle 31">
-            <a:extLst>
-              <a:ext uri="{FF2B5EF4-FFF2-40B4-BE49-F238E27FC236}">
-                <a16:creationId xmlns:a16="http://schemas.microsoft.com/office/drawing/2014/main" id="{12F7E335-851A-4CAE-B09F-E657819D4600}"/>
-              </a:ext>
-              <a:ext uri="{C183D7F6-B498-43B3-948B-1728B52AA6E4}">
-                <adec:decorative xmlns:adec="http://schemas.microsoft.com/office/drawing/2017/decorative" val="1"/>
-              </a:ext>
-            </a:extLst>
-          </p:cNvPr>
-          <p:cNvSpPr>
-            <a:spLocks noGrp="1" noRot="1" noChangeAspect="1" noMove="1" noResize="1" noEditPoints="1" noAdjustHandles="1" noChangeArrowheads="1" noChangeShapeType="1" noTextEdit="1"/>
-          </p:cNvSpPr>
-          <p:nvPr>
-            <p:extLst>
-              <p:ext uri="{386F3935-93C4-4BCD-93E2-E3B085C9AB24}">
-                <p16:designElem xmlns:p16="http://schemas.microsoft.com/office/powerpoint/2015/main" val="1"/>
-              </p:ext>
-            </p:extLst>
-          </p:nvPr>
-        </p:nvSpPr>
-        <p:spPr>
-          <a:xfrm>
-            <a:off x="10437812" y="0"/>
-            <a:ext cx="685800" cy="1143000"/>
-          </a:xfrm>
-          <a:prstGeom prst="rect">
-            <a:avLst/>
-          </a:prstGeom>
-          <a:solidFill>
-            <a:schemeClr val="accent1"/>
-          </a:solidFill>
-          <a:ln>
-            <a:noFill/>
-          </a:ln>
-        </p:spPr>
-        <p:style>
-          <a:lnRef idx="1">
-            <a:schemeClr val="accent1"/>
-          </a:lnRef>
-          <a:fillRef idx="3">
-            <a:schemeClr val="accent1"/>
-          </a:fillRef>
-          <a:effectRef idx="2">
-            <a:schemeClr val="accent1"/>
-          </a:effectRef>
-          <a:fontRef idx="minor">
-            <a:schemeClr val="lt1"/>
-          </a:fontRef>
-        </p:style>
-      </p:sp>
-      <p:sp>
-        <p:nvSpPr>
-          <p:cNvPr id="34" name="Freeform: Shape 33">
-            <a:extLst>
-              <a:ext uri="{FF2B5EF4-FFF2-40B4-BE49-F238E27FC236}">
-                <a16:creationId xmlns:a16="http://schemas.microsoft.com/office/drawing/2014/main" id="{10B541F0-7F6E-402E-84D8-CF96EACA5FBC}"/>
-              </a:ext>
-              <a:ext uri="{C183D7F6-B498-43B3-948B-1728B52AA6E4}">
-                <adec:decorative xmlns:adec="http://schemas.microsoft.com/office/drawing/2017/decorative" val="1"/>
-              </a:ext>
-            </a:extLst>
-          </p:cNvPr>
-          <p:cNvSpPr>
-            <a:spLocks noGrp="1" noRot="1" noChangeAspect="1" noMove="1" noResize="1" noEditPoints="1" noAdjustHandles="1" noChangeArrowheads="1" noChangeShapeType="1" noTextEdit="1"/>
-          </p:cNvSpPr>
-          <p:nvPr>
-            <p:extLst>
-              <p:ext uri="{386F3935-93C4-4BCD-93E2-E3B085C9AB24}">
-                <p16:designElem xmlns:p16="http://schemas.microsoft.com/office/powerpoint/2015/main" val="1"/>
-              </p:ext>
-            </p:extLst>
-          </p:nvPr>
-        </p:nvSpPr>
-        <p:spPr bwMode="gray">
-          <a:xfrm>
-            <a:off x="-1" y="1762067"/>
-            <a:ext cx="12192418" cy="5095933"/>
-          </a:xfrm>
-          <a:custGeom>
-            <a:avLst/>
-            <a:gdLst>
-              <a:gd name="connsiteX0" fmla="*/ 1 w 12192418"/>
-              <a:gd name="connsiteY0" fmla="*/ 0 h 5095933"/>
-              <a:gd name="connsiteX1" fmla="*/ 71932 w 12192418"/>
-              <a:gd name="connsiteY1" fmla="*/ 12261 h 5095933"/>
-              <a:gd name="connsiteX2" fmla="*/ 282849 w 12192418"/>
-              <a:gd name="connsiteY2" fmla="*/ 48343 h 5095933"/>
-              <a:gd name="connsiteX3" fmla="*/ 436464 w 12192418"/>
-              <a:gd name="connsiteY3" fmla="*/ 73565 h 5095933"/>
-              <a:gd name="connsiteX4" fmla="*/ 619339 w 12192418"/>
-              <a:gd name="connsiteY4" fmla="*/ 100188 h 5095933"/>
-              <a:gd name="connsiteX5" fmla="*/ 836351 w 12192418"/>
-              <a:gd name="connsiteY5" fmla="*/ 132066 h 5095933"/>
-              <a:gd name="connsiteX6" fmla="*/ 1076528 w 12192418"/>
-              <a:gd name="connsiteY6" fmla="*/ 165696 h 5095933"/>
-              <a:gd name="connsiteX7" fmla="*/ 1347184 w 12192418"/>
-              <a:gd name="connsiteY7" fmla="*/ 201077 h 5095933"/>
-              <a:gd name="connsiteX8" fmla="*/ 1642223 w 12192418"/>
-              <a:gd name="connsiteY8" fmla="*/ 238560 h 5095933"/>
-              <a:gd name="connsiteX9" fmla="*/ 1962864 w 12192418"/>
-              <a:gd name="connsiteY9" fmla="*/ 276043 h 5095933"/>
-              <a:gd name="connsiteX10" fmla="*/ 2304232 w 12192418"/>
-              <a:gd name="connsiteY10" fmla="*/ 314227 h 5095933"/>
-              <a:gd name="connsiteX11" fmla="*/ 2672421 w 12192418"/>
-              <a:gd name="connsiteY11" fmla="*/ 349608 h 5095933"/>
-              <a:gd name="connsiteX12" fmla="*/ 3057678 w 12192418"/>
-              <a:gd name="connsiteY12" fmla="*/ 383588 h 5095933"/>
-              <a:gd name="connsiteX13" fmla="*/ 3464881 w 12192418"/>
-              <a:gd name="connsiteY13" fmla="*/ 414415 h 5095933"/>
-              <a:gd name="connsiteX14" fmla="*/ 3889152 w 12192418"/>
-              <a:gd name="connsiteY14" fmla="*/ 443841 h 5095933"/>
-              <a:gd name="connsiteX15" fmla="*/ 4331710 w 12192418"/>
-              <a:gd name="connsiteY15" fmla="*/ 471515 h 5095933"/>
-              <a:gd name="connsiteX16" fmla="*/ 4558476 w 12192418"/>
-              <a:gd name="connsiteY16" fmla="*/ 481324 h 5095933"/>
-              <a:gd name="connsiteX17" fmla="*/ 4790118 w 12192418"/>
-              <a:gd name="connsiteY17" fmla="*/ 492183 h 5095933"/>
-              <a:gd name="connsiteX18" fmla="*/ 5025418 w 12192418"/>
-              <a:gd name="connsiteY18" fmla="*/ 502342 h 5095933"/>
-              <a:gd name="connsiteX19" fmla="*/ 5261937 w 12192418"/>
-              <a:gd name="connsiteY19" fmla="*/ 508998 h 5095933"/>
-              <a:gd name="connsiteX20" fmla="*/ 5503332 w 12192418"/>
-              <a:gd name="connsiteY20" fmla="*/ 514953 h 5095933"/>
-              <a:gd name="connsiteX21" fmla="*/ 5747167 w 12192418"/>
-              <a:gd name="connsiteY21" fmla="*/ 521259 h 5095933"/>
-              <a:gd name="connsiteX22" fmla="*/ 5995877 w 12192418"/>
-              <a:gd name="connsiteY22" fmla="*/ 525463 h 5095933"/>
-              <a:gd name="connsiteX23" fmla="*/ 6247026 w 12192418"/>
-              <a:gd name="connsiteY23" fmla="*/ 525463 h 5095933"/>
-              <a:gd name="connsiteX24" fmla="*/ 6500613 w 12192418"/>
-              <a:gd name="connsiteY24" fmla="*/ 527565 h 5095933"/>
-              <a:gd name="connsiteX25" fmla="*/ 6756639 w 12192418"/>
-              <a:gd name="connsiteY25" fmla="*/ 525463 h 5095933"/>
-              <a:gd name="connsiteX26" fmla="*/ 7016322 w 12192418"/>
-              <a:gd name="connsiteY26" fmla="*/ 521259 h 5095933"/>
-              <a:gd name="connsiteX27" fmla="*/ 7276005 w 12192418"/>
-              <a:gd name="connsiteY27" fmla="*/ 517406 h 5095933"/>
-              <a:gd name="connsiteX28" fmla="*/ 7539345 w 12192418"/>
-              <a:gd name="connsiteY28" fmla="*/ 508998 h 5095933"/>
-              <a:gd name="connsiteX29" fmla="*/ 7805124 w 12192418"/>
-              <a:gd name="connsiteY29" fmla="*/ 500241 h 5095933"/>
-              <a:gd name="connsiteX30" fmla="*/ 8070903 w 12192418"/>
-              <a:gd name="connsiteY30" fmla="*/ 490082 h 5095933"/>
-              <a:gd name="connsiteX31" fmla="*/ 8339121 w 12192418"/>
-              <a:gd name="connsiteY31" fmla="*/ 475719 h 5095933"/>
-              <a:gd name="connsiteX32" fmla="*/ 8609776 w 12192418"/>
-              <a:gd name="connsiteY32" fmla="*/ 458554 h 5095933"/>
-              <a:gd name="connsiteX33" fmla="*/ 8881651 w 12192418"/>
-              <a:gd name="connsiteY33" fmla="*/ 442089 h 5095933"/>
-              <a:gd name="connsiteX34" fmla="*/ 9153526 w 12192418"/>
-              <a:gd name="connsiteY34" fmla="*/ 421071 h 5095933"/>
-              <a:gd name="connsiteX35" fmla="*/ 9429058 w 12192418"/>
-              <a:gd name="connsiteY35" fmla="*/ 395849 h 5095933"/>
-              <a:gd name="connsiteX36" fmla="*/ 9700933 w 12192418"/>
-              <a:gd name="connsiteY36" fmla="*/ 370626 h 5095933"/>
-              <a:gd name="connsiteX37" fmla="*/ 9977684 w 12192418"/>
-              <a:gd name="connsiteY37" fmla="*/ 341551 h 5095933"/>
-              <a:gd name="connsiteX38" fmla="*/ 10255655 w 12192418"/>
-              <a:gd name="connsiteY38" fmla="*/ 309673 h 5095933"/>
-              <a:gd name="connsiteX39" fmla="*/ 10529968 w 12192418"/>
-              <a:gd name="connsiteY39" fmla="*/ 276043 h 5095933"/>
-              <a:gd name="connsiteX40" fmla="*/ 10807939 w 12192418"/>
-              <a:gd name="connsiteY40" fmla="*/ 236809 h 5095933"/>
-              <a:gd name="connsiteX41" fmla="*/ 11084690 w 12192418"/>
-              <a:gd name="connsiteY41" fmla="*/ 194772 h 5095933"/>
-              <a:gd name="connsiteX42" fmla="*/ 11362661 w 12192418"/>
-              <a:gd name="connsiteY42" fmla="*/ 153085 h 5095933"/>
-              <a:gd name="connsiteX43" fmla="*/ 11639412 w 12192418"/>
-              <a:gd name="connsiteY43" fmla="*/ 104392 h 5095933"/>
-              <a:gd name="connsiteX44" fmla="*/ 11914945 w 12192418"/>
-              <a:gd name="connsiteY44" fmla="*/ 54648 h 5095933"/>
-              <a:gd name="connsiteX45" fmla="*/ 12191696 w 12192418"/>
-              <a:gd name="connsiteY45" fmla="*/ 2452 h 5095933"/>
-              <a:gd name="connsiteX46" fmla="*/ 12191696 w 12192418"/>
-              <a:gd name="connsiteY46" fmla="*/ 2109542 h 5095933"/>
-              <a:gd name="connsiteX47" fmla="*/ 12191999 w 12192418"/>
-              <a:gd name="connsiteY47" fmla="*/ 2109542 h 5095933"/>
-              <a:gd name="connsiteX48" fmla="*/ 12191999 w 12192418"/>
-              <a:gd name="connsiteY48" fmla="*/ 2802467 h 5095933"/>
-              <a:gd name="connsiteX49" fmla="*/ 12192418 w 12192418"/>
-              <a:gd name="connsiteY49" fmla="*/ 2802467 h 5095933"/>
-              <a:gd name="connsiteX50" fmla="*/ 12192418 w 12192418"/>
-              <a:gd name="connsiteY50" fmla="*/ 5095933 h 5095933"/>
-              <a:gd name="connsiteX51" fmla="*/ 1 w 12192418"/>
-              <a:gd name="connsiteY51" fmla="*/ 5095933 h 5095933"/>
-              <a:gd name="connsiteX52" fmla="*/ 1 w 12192418"/>
-              <a:gd name="connsiteY52" fmla="*/ 4074529 h 5095933"/>
-              <a:gd name="connsiteX53" fmla="*/ 0 w 12192418"/>
-              <a:gd name="connsiteY53" fmla="*/ 4074529 h 5095933"/>
-              <a:gd name="connsiteX54" fmla="*/ 0 w 12192418"/>
-              <a:gd name="connsiteY54" fmla="*/ 2109542 h 5095933"/>
-              <a:gd name="connsiteX55" fmla="*/ 1 w 12192418"/>
-              <a:gd name="connsiteY55" fmla="*/ 2109542 h 5095933"/>
-            </a:gdLst>
-            <a:ahLst/>
-            <a:cxnLst>
-              <a:cxn ang="0">
-                <a:pos x="connsiteX0" y="connsiteY0"/>
-              </a:cxn>
-              <a:cxn ang="0">
-                <a:pos x="connsiteX1" y="connsiteY1"/>
-              </a:cxn>
-              <a:cxn ang="0">
-                <a:pos x="connsiteX2" y="connsiteY2"/>
-              </a:cxn>
-              <a:cxn ang="0">
-                <a:pos x="connsiteX3" y="connsiteY3"/>
-              </a:cxn>
-              <a:cxn ang="0">
-                <a:pos x="connsiteX4" y="connsiteY4"/>
-              </a:cxn>
-              <a:cxn ang="0">
-                <a:pos x="connsiteX5" y="connsiteY5"/>
-              </a:cxn>
-              <a:cxn ang="0">
-                <a:pos x="connsiteX6" y="connsiteY6"/>
-              </a:cxn>
-              <a:cxn ang="0">
-                <a:pos x="connsiteX7" y="connsiteY7"/>
-              </a:cxn>
-              <a:cxn ang="0">
-                <a:pos x="connsiteX8" y="connsiteY8"/>
-              </a:cxn>
-              <a:cxn ang="0">
-                <a:pos x="connsiteX9" y="connsiteY9"/>
-              </a:cxn>
-              <a:cxn ang="0">
-                <a:pos x="connsiteX10" y="connsiteY10"/>
-              </a:cxn>
-              <a:cxn ang="0">
-                <a:pos x="connsiteX11" y="connsiteY11"/>
-              </a:cxn>
-              <a:cxn ang="0">
-                <a:pos x="connsiteX12" y="connsiteY12"/>
-              </a:cxn>
-              <a:cxn ang="0">
-                <a:pos x="connsiteX13" y="connsiteY13"/>
-              </a:cxn>
-              <a:cxn ang="0">
-                <a:pos x="connsiteX14" y="connsiteY14"/>
-              </a:cxn>
-              <a:cxn ang="0">
-                <a:pos x="connsiteX15" y="connsiteY15"/>
-              </a:cxn>
-              <a:cxn ang="0">
-                <a:pos x="connsiteX16" y="connsiteY16"/>
-              </a:cxn>
-              <a:cxn ang="0">
-                <a:pos x="connsiteX17" y="connsiteY17"/>
-              </a:cxn>
-              <a:cxn ang="0">
-                <a:pos x="connsiteX18" y="connsiteY18"/>
-              </a:cxn>
-              <a:cxn ang="0">
-                <a:pos x="connsiteX19" y="connsiteY19"/>
-              </a:cxn>
-              <a:cxn ang="0">
-                <a:pos x="connsiteX20" y="connsiteY20"/>
-              </a:cxn>
-              <a:cxn ang="0">
-                <a:pos x="connsiteX21" y="connsiteY21"/>
-              </a:cxn>
-              <a:cxn ang="0">
-                <a:pos x="connsiteX22" y="connsiteY22"/>
-              </a:cxn>
-              <a:cxn ang="0">
-                <a:pos x="connsiteX23" y="connsiteY23"/>
-              </a:cxn>
-              <a:cxn ang="0">
-                <a:pos x="connsiteX24" y="connsiteY24"/>
-              </a:cxn>
-              <a:cxn ang="0">
-                <a:pos x="connsiteX25" y="connsiteY25"/>
-              </a:cxn>
-              <a:cxn ang="0">
-                <a:pos x="connsiteX26" y="connsiteY26"/>
-              </a:cxn>
-              <a:cxn ang="0">
-                <a:pos x="connsiteX27" y="connsiteY27"/>
-              </a:cxn>
-              <a:cxn ang="0">
-                <a:pos x="connsiteX28" y="connsiteY28"/>
-              </a:cxn>
-              <a:cxn ang="0">
-                <a:pos x="connsiteX29" y="connsiteY29"/>
-              </a:cxn>
-              <a:cxn ang="0">
-                <a:pos x="connsiteX30" y="connsiteY30"/>
-              </a:cxn>
-              <a:cxn ang="0">
-                <a:pos x="connsiteX31" y="connsiteY31"/>
-              </a:cxn>
-              <a:cxn ang="0">
-                <a:pos x="connsiteX32" y="connsiteY32"/>
-              </a:cxn>
-              <a:cxn ang="0">
-                <a:pos x="connsiteX33" y="connsiteY33"/>
-              </a:cxn>
-              <a:cxn ang="0">
-                <a:pos x="connsiteX34" y="connsiteY34"/>
-              </a:cxn>
-              <a:cxn ang="0">
-                <a:pos x="connsiteX35" y="connsiteY35"/>
-              </a:cxn>
-              <a:cxn ang="0">
-                <a:pos x="connsiteX36" y="connsiteY36"/>
-              </a:cxn>
-              <a:cxn ang="0">
-                <a:pos x="connsiteX37" y="connsiteY37"/>
-              </a:cxn>
-              <a:cxn ang="0">
-                <a:pos x="connsiteX38" y="connsiteY38"/>
-              </a:cxn>
-              <a:cxn ang="0">
-                <a:pos x="connsiteX39" y="connsiteY39"/>
-              </a:cxn>
-              <a:cxn ang="0">
-                <a:pos x="connsiteX40" y="connsiteY40"/>
-              </a:cxn>
-              <a:cxn ang="0">
-                <a:pos x="connsiteX41" y="connsiteY41"/>
-              </a:cxn>
-              <a:cxn ang="0">
-                <a:pos x="connsiteX42" y="connsiteY42"/>
-              </a:cxn>
-              <a:cxn ang="0">
-                <a:pos x="connsiteX43" y="connsiteY43"/>
-              </a:cxn>
-              <a:cxn ang="0">
-                <a:pos x="connsiteX44" y="connsiteY44"/>
-              </a:cxn>
-              <a:cxn ang="0">
-                <a:pos x="connsiteX45" y="connsiteY45"/>
-              </a:cxn>
-              <a:cxn ang="0">
-                <a:pos x="connsiteX46" y="connsiteY46"/>
-              </a:cxn>
-              <a:cxn ang="0">
-                <a:pos x="connsiteX47" y="connsiteY47"/>
-              </a:cxn>
-              <a:cxn ang="0">
-                <a:pos x="connsiteX48" y="connsiteY48"/>
-              </a:cxn>
-              <a:cxn ang="0">
-                <a:pos x="connsiteX49" y="connsiteY49"/>
-              </a:cxn>
-              <a:cxn ang="0">
-                <a:pos x="connsiteX50" y="connsiteY50"/>
-              </a:cxn>
-              <a:cxn ang="0">
-                <a:pos x="connsiteX51" y="connsiteY51"/>
-              </a:cxn>
-              <a:cxn ang="0">
-                <a:pos x="connsiteX52" y="connsiteY52"/>
-              </a:cxn>
-              <a:cxn ang="0">
-                <a:pos x="connsiteX53" y="connsiteY53"/>
-              </a:cxn>
-              <a:cxn ang="0">
-                <a:pos x="connsiteX54" y="connsiteY54"/>
-              </a:cxn>
-              <a:cxn ang="0">
-                <a:pos x="connsiteX55" y="connsiteY55"/>
-              </a:cxn>
-            </a:cxnLst>
-            <a:rect l="l" t="t" r="r" b="b"/>
-            <a:pathLst>
-              <a:path w="12192418" h="5095933">
-                <a:moveTo>
-                  <a:pt x="1" y="0"/>
-                </a:moveTo>
-                <a:lnTo>
-                  <a:pt x="71932" y="12261"/>
-                </a:lnTo>
-                <a:lnTo>
-                  <a:pt x="282849" y="48343"/>
-                </a:lnTo>
-                <a:lnTo>
-                  <a:pt x="436464" y="73565"/>
-                </a:lnTo>
-                <a:lnTo>
-                  <a:pt x="619339" y="100188"/>
-                </a:lnTo>
-                <a:lnTo>
-                  <a:pt x="836351" y="132066"/>
-                </a:lnTo>
-                <a:lnTo>
-                  <a:pt x="1076528" y="165696"/>
-                </a:lnTo>
-                <a:lnTo>
-                  <a:pt x="1347184" y="201077"/>
-                </a:lnTo>
-                <a:lnTo>
-                  <a:pt x="1642223" y="238560"/>
-                </a:lnTo>
-                <a:lnTo>
-                  <a:pt x="1962864" y="276043"/>
-                </a:lnTo>
-                <a:lnTo>
-                  <a:pt x="2304232" y="314227"/>
-                </a:lnTo>
-                <a:lnTo>
-                  <a:pt x="2672421" y="349608"/>
-                </a:lnTo>
-                <a:lnTo>
-                  <a:pt x="3057678" y="383588"/>
-                </a:lnTo>
-                <a:lnTo>
-                  <a:pt x="3464881" y="414415"/>
-                </a:lnTo>
-                <a:lnTo>
-                  <a:pt x="3889152" y="443841"/>
-                </a:lnTo>
-                <a:lnTo>
-                  <a:pt x="4331710" y="471515"/>
-                </a:lnTo>
-                <a:lnTo>
-                  <a:pt x="4558476" y="481324"/>
-                </a:lnTo>
-                <a:lnTo>
-                  <a:pt x="4790118" y="492183"/>
-                </a:lnTo>
-                <a:lnTo>
-                  <a:pt x="5025418" y="502342"/>
-                </a:lnTo>
-                <a:lnTo>
-                  <a:pt x="5261937" y="508998"/>
-                </a:lnTo>
-                <a:lnTo>
-                  <a:pt x="5503332" y="514953"/>
-                </a:lnTo>
-                <a:lnTo>
-                  <a:pt x="5747167" y="521259"/>
-                </a:lnTo>
-                <a:lnTo>
-                  <a:pt x="5995877" y="525463"/>
-                </a:lnTo>
-                <a:lnTo>
-                  <a:pt x="6247026" y="525463"/>
-                </a:lnTo>
-                <a:lnTo>
-                  <a:pt x="6500613" y="527565"/>
-                </a:lnTo>
-                <a:lnTo>
-                  <a:pt x="6756639" y="525463"/>
-                </a:lnTo>
-                <a:lnTo>
-                  <a:pt x="7016322" y="521259"/>
-                </a:lnTo>
-                <a:lnTo>
-                  <a:pt x="7276005" y="517406"/>
-                </a:lnTo>
-                <a:lnTo>
-                  <a:pt x="7539345" y="508998"/>
-                </a:lnTo>
-                <a:lnTo>
-                  <a:pt x="7805124" y="500241"/>
-                </a:lnTo>
-                <a:lnTo>
-                  <a:pt x="8070903" y="490082"/>
-                </a:lnTo>
-                <a:lnTo>
-                  <a:pt x="8339121" y="475719"/>
-                </a:lnTo>
-                <a:lnTo>
-                  <a:pt x="8609776" y="458554"/>
-                </a:lnTo>
-                <a:lnTo>
-                  <a:pt x="8881651" y="442089"/>
-                </a:lnTo>
-                <a:lnTo>
-                  <a:pt x="9153526" y="421071"/>
-                </a:lnTo>
-                <a:lnTo>
-                  <a:pt x="9429058" y="395849"/>
-                </a:lnTo>
-                <a:lnTo>
-                  <a:pt x="9700933" y="370626"/>
-                </a:lnTo>
-                <a:lnTo>
-                  <a:pt x="9977684" y="341551"/>
-                </a:lnTo>
-                <a:lnTo>
-                  <a:pt x="10255655" y="309673"/>
-                </a:lnTo>
-                <a:lnTo>
-                  <a:pt x="10529968" y="276043"/>
-                </a:lnTo>
-                <a:lnTo>
-                  <a:pt x="10807939" y="236809"/>
-                </a:lnTo>
-                <a:lnTo>
-                  <a:pt x="11084690" y="194772"/>
-                </a:lnTo>
-                <a:lnTo>
-                  <a:pt x="11362661" y="153085"/>
-                </a:lnTo>
-                <a:lnTo>
-                  <a:pt x="11639412" y="104392"/>
-                </a:lnTo>
-                <a:lnTo>
-                  <a:pt x="11914945" y="54648"/>
-                </a:lnTo>
-                <a:lnTo>
-                  <a:pt x="12191696" y="2452"/>
-                </a:lnTo>
-                <a:lnTo>
-                  <a:pt x="12191696" y="2109542"/>
-                </a:lnTo>
-                <a:lnTo>
-                  <a:pt x="12191999" y="2109542"/>
-                </a:lnTo>
-                <a:lnTo>
-                  <a:pt x="12191999" y="2802467"/>
-                </a:lnTo>
-                <a:lnTo>
-                  <a:pt x="12192418" y="2802467"/>
-                </a:lnTo>
-                <a:lnTo>
-                  <a:pt x="12192418" y="5095933"/>
-                </a:lnTo>
-                <a:lnTo>
-                  <a:pt x="1" y="5095933"/>
-                </a:lnTo>
-                <a:lnTo>
-                  <a:pt x="1" y="4074529"/>
-                </a:lnTo>
-                <a:lnTo>
-                  <a:pt x="0" y="4074529"/>
-                </a:lnTo>
-                <a:lnTo>
-                  <a:pt x="0" y="2109542"/>
-                </a:lnTo>
-                <a:lnTo>
-                  <a:pt x="1" y="2109542"/>
-                </a:lnTo>
-                <a:close/>
-              </a:path>
-            </a:pathLst>
-          </a:custGeom>
-          <a:solidFill>
-            <a:schemeClr val="bg1"/>
-          </a:solidFill>
-          <a:ln>
-            <a:noFill/>
-          </a:ln>
-        </p:spPr>
-      </p:sp>
-      <p:graphicFrame>
-        <p:nvGraphicFramePr>
-          <p:cNvPr id="23" name="Content Placeholder 2">
-            <a:extLst>
-              <a:ext uri="{FF2B5EF4-FFF2-40B4-BE49-F238E27FC236}">
-                <a16:creationId xmlns:a16="http://schemas.microsoft.com/office/drawing/2014/main" id="{673C4480-3B1C-4891-87DA-DFB74576E73B}"/>
-              </a:ext>
-            </a:extLst>
-          </p:cNvPr>
-          <p:cNvGraphicFramePr>
-            <a:graphicFrameLocks noGrp="1"/>
-          </p:cNvGraphicFramePr>
-          <p:nvPr>
-            <p:ph idx="1"/>
-            <p:extLst>
-              <p:ext uri="{D42A27DB-BD31-4B8C-83A1-F6EECF244321}">
-                <p14:modId xmlns:p14="http://schemas.microsoft.com/office/powerpoint/2010/main" val="449505714"/>
-              </p:ext>
-            </p:extLst>
-          </p:nvPr>
-        </p:nvGraphicFramePr>
-        <p:xfrm>
-          <a:off x="648930" y="2810256"/>
-          <a:ext cx="10895370" cy="3404277"/>
-        </p:xfrm>
-        <a:graphic>
-          <a:graphicData uri="http://schemas.openxmlformats.org/drawingml/2006/diagram">
-            <dgm:relIds xmlns:dgm="http://schemas.openxmlformats.org/drawingml/2006/diagram" xmlns:r="http://schemas.openxmlformats.org/officeDocument/2006/relationships" r:dm="rId2" r:lo="rId3" r:qs="rId4" r:cs="rId5"/>
-          </a:graphicData>
-        </a:graphic>
-      </p:graphicFrame>
     </p:spTree>
     <p:extLst>
       <p:ext uri="{BB962C8B-B14F-4D97-AF65-F5344CB8AC3E}">
-        <p14:creationId xmlns:p14="http://schemas.microsoft.com/office/powerpoint/2010/main" val="3579712629"/>
+        <p14:creationId xmlns:p14="http://schemas.microsoft.com/office/powerpoint/2010/main" val="3404747059"/>
       </p:ext>
     </p:extLst>
   </p:cSld>
   <p:clrMapOvr>
-    <a:overrideClrMapping bg1="lt1" tx1="dk1" bg2="lt2" tx2="dk2" accent1="accent1" accent2="accent2" accent3="accent3" accent4="accent4" accent5="accent5" accent6="accent6" hlink="hlink" folHlink="folHlink"/>
+    <a:masterClrMapping/>
   </p:clrMapOvr>
 </p:sld>
 </file>

</xml_diff>

<commit_message>
Added Slide and Updated Unreal Slide
</commit_message>
<xml_diff>
--- a/How to Make Games at Home for Cheap.pptx
+++ b/How to Make Games at Home for Cheap.pptx
@@ -18,7 +18,8 @@
     <p:sldId id="268" r:id="rId12"/>
     <p:sldId id="269" r:id="rId13"/>
     <p:sldId id="258" r:id="rId14"/>
-    <p:sldId id="257" r:id="rId15"/>
+    <p:sldId id="270" r:id="rId15"/>
+    <p:sldId id="257" r:id="rId16"/>
   </p:sldIdLst>
   <p:sldSz cx="12192000" cy="6858000"/>
   <p:notesSz cx="6858000" cy="9144000"/>
@@ -5749,7 +5750,7 @@
           <a:p>
             <a:fld id="{8B57E792-C84F-4027-88D4-C053A09D18A8}" type="datetimeFigureOut">
               <a:rPr lang="en-US" smtClean="0"/>
-              <a:t>8/20/2019</a:t>
+              <a:t>10/5/2019</a:t>
             </a:fld>
             <a:endParaRPr lang="en-US"/>
           </a:p>
@@ -6024,7 +6025,7 @@
           <a:p>
             <a:fld id="{8B57E792-C84F-4027-88D4-C053A09D18A8}" type="datetimeFigureOut">
               <a:rPr lang="en-US" smtClean="0"/>
-              <a:t>8/20/2019</a:t>
+              <a:t>10/5/2019</a:t>
             </a:fld>
             <a:endParaRPr lang="en-US"/>
           </a:p>
@@ -6218,7 +6219,7 @@
           <a:p>
             <a:fld id="{8B57E792-C84F-4027-88D4-C053A09D18A8}" type="datetimeFigureOut">
               <a:rPr lang="en-US" smtClean="0"/>
-              <a:t>8/20/2019</a:t>
+              <a:t>10/5/2019</a:t>
             </a:fld>
             <a:endParaRPr lang="en-US"/>
           </a:p>
@@ -6491,7 +6492,7 @@
           <a:p>
             <a:fld id="{8B57E792-C84F-4027-88D4-C053A09D18A8}" type="datetimeFigureOut">
               <a:rPr lang="en-US" smtClean="0"/>
-              <a:t>8/20/2019</a:t>
+              <a:t>10/5/2019</a:t>
             </a:fld>
             <a:endParaRPr lang="en-US"/>
           </a:p>
@@ -6832,7 +6833,7 @@
           <a:p>
             <a:fld id="{8B57E792-C84F-4027-88D4-C053A09D18A8}" type="datetimeFigureOut">
               <a:rPr lang="en-US" smtClean="0"/>
-              <a:t>8/20/2019</a:t>
+              <a:t>10/5/2019</a:t>
             </a:fld>
             <a:endParaRPr lang="en-US"/>
           </a:p>
@@ -7455,7 +7456,7 @@
           <a:p>
             <a:fld id="{8B57E792-C84F-4027-88D4-C053A09D18A8}" type="datetimeFigureOut">
               <a:rPr lang="en-US" smtClean="0"/>
-              <a:t>8/20/2019</a:t>
+              <a:t>10/5/2019</a:t>
             </a:fld>
             <a:endParaRPr lang="en-US"/>
           </a:p>
@@ -8315,7 +8316,7 @@
           <a:p>
             <a:fld id="{8B57E792-C84F-4027-88D4-C053A09D18A8}" type="datetimeFigureOut">
               <a:rPr lang="en-US" smtClean="0"/>
-              <a:t>8/20/2019</a:t>
+              <a:t>10/5/2019</a:t>
             </a:fld>
             <a:endParaRPr lang="en-US"/>
           </a:p>
@@ -8485,7 +8486,7 @@
           <a:p>
             <a:fld id="{8B57E792-C84F-4027-88D4-C053A09D18A8}" type="datetimeFigureOut">
               <a:rPr lang="en-US" smtClean="0"/>
-              <a:t>8/20/2019</a:t>
+              <a:t>10/5/2019</a:t>
             </a:fld>
             <a:endParaRPr lang="en-US"/>
           </a:p>
@@ -8665,7 +8666,7 @@
           <a:p>
             <a:fld id="{8B57E792-C84F-4027-88D4-C053A09D18A8}" type="datetimeFigureOut">
               <a:rPr lang="en-US" smtClean="0"/>
-              <a:t>8/20/2019</a:t>
+              <a:t>10/5/2019</a:t>
             </a:fld>
             <a:endParaRPr lang="en-US"/>
           </a:p>
@@ -8835,7 +8836,7 @@
           <a:p>
             <a:fld id="{8B57E792-C84F-4027-88D4-C053A09D18A8}" type="datetimeFigureOut">
               <a:rPr lang="en-US" smtClean="0"/>
-              <a:t>8/20/2019</a:t>
+              <a:t>10/5/2019</a:t>
             </a:fld>
             <a:endParaRPr lang="en-US"/>
           </a:p>
@@ -9082,7 +9083,7 @@
           <a:p>
             <a:fld id="{8B57E792-C84F-4027-88D4-C053A09D18A8}" type="datetimeFigureOut">
               <a:rPr lang="en-US" smtClean="0"/>
-              <a:t>8/20/2019</a:t>
+              <a:t>10/5/2019</a:t>
             </a:fld>
             <a:endParaRPr lang="en-US"/>
           </a:p>
@@ -9374,7 +9375,7 @@
           <a:p>
             <a:fld id="{8B57E792-C84F-4027-88D4-C053A09D18A8}" type="datetimeFigureOut">
               <a:rPr lang="en-US" smtClean="0"/>
-              <a:t>8/20/2019</a:t>
+              <a:t>10/5/2019</a:t>
             </a:fld>
             <a:endParaRPr lang="en-US"/>
           </a:p>
@@ -9818,7 +9819,7 @@
           <a:p>
             <a:fld id="{8B57E792-C84F-4027-88D4-C053A09D18A8}" type="datetimeFigureOut">
               <a:rPr lang="en-US" smtClean="0"/>
-              <a:t>8/20/2019</a:t>
+              <a:t>10/5/2019</a:t>
             </a:fld>
             <a:endParaRPr lang="en-US"/>
           </a:p>
@@ -9936,7 +9937,7 @@
           <a:p>
             <a:fld id="{8B57E792-C84F-4027-88D4-C053A09D18A8}" type="datetimeFigureOut">
               <a:rPr lang="en-US" smtClean="0"/>
-              <a:t>8/20/2019</a:t>
+              <a:t>10/5/2019</a:t>
             </a:fld>
             <a:endParaRPr lang="en-US"/>
           </a:p>
@@ -10031,7 +10032,7 @@
           <a:p>
             <a:fld id="{8B57E792-C84F-4027-88D4-C053A09D18A8}" type="datetimeFigureOut">
               <a:rPr lang="en-US" smtClean="0"/>
-              <a:t>8/20/2019</a:t>
+              <a:t>10/5/2019</a:t>
             </a:fld>
             <a:endParaRPr lang="en-US"/>
           </a:p>
@@ -10310,7 +10311,7 @@
           <a:p>
             <a:fld id="{8B57E792-C84F-4027-88D4-C053A09D18A8}" type="datetimeFigureOut">
               <a:rPr lang="en-US" smtClean="0"/>
-              <a:t>8/20/2019</a:t>
+              <a:t>10/5/2019</a:t>
             </a:fld>
             <a:endParaRPr lang="en-US"/>
           </a:p>
@@ -10585,7 +10586,7 @@
           <a:p>
             <a:fld id="{8B57E792-C84F-4027-88D4-C053A09D18A8}" type="datetimeFigureOut">
               <a:rPr lang="en-US" smtClean="0"/>
-              <a:t>8/20/2019</a:t>
+              <a:t>10/5/2019</a:t>
             </a:fld>
             <a:endParaRPr lang="en-US"/>
           </a:p>
@@ -11014,7 +11015,7 @@
           <a:p>
             <a:fld id="{8B57E792-C84F-4027-88D4-C053A09D18A8}" type="datetimeFigureOut">
               <a:rPr lang="en-US" smtClean="0"/>
-              <a:t>8/20/2019</a:t>
+              <a:t>10/5/2019</a:t>
             </a:fld>
             <a:endParaRPr lang="en-US"/>
           </a:p>
@@ -11881,7 +11882,9 @@
           </a:xfrm>
         </p:spPr>
         <p:txBody>
-          <a:bodyPr/>
+          <a:bodyPr>
+            <a:normAutofit fontScale="92500" lnSpcReduction="20000"/>
+          </a:bodyPr>
           <a:lstStyle/>
           <a:p>
             <a:pPr marL="0" indent="0">
@@ -11891,7 +11894,30 @@
               <a:rPr lang="en-US" b="1" dirty="0"/>
               <a:t>Pros</a:t>
             </a:r>
-            <a:endParaRPr lang="en-US" dirty="0"/>
+          </a:p>
+          <a:p>
+            <a:r>
+              <a:rPr lang="en-US" b="1" dirty="0"/>
+              <a:t>Simple to use</a:t>
+            </a:r>
+          </a:p>
+          <a:p>
+            <a:r>
+              <a:rPr lang="en-US" b="1" dirty="0"/>
+              <a:t>Simplifies and streamlines a generally difficult to make game type</a:t>
+            </a:r>
+          </a:p>
+          <a:p>
+            <a:r>
+              <a:rPr lang="en-US" b="1" dirty="0"/>
+              <a:t>Premade Assets and Characters</a:t>
+            </a:r>
+          </a:p>
+          <a:p>
+            <a:r>
+              <a:rPr lang="en-US" b="1" dirty="0"/>
+              <a:t>Active community</a:t>
+            </a:r>
           </a:p>
           <a:p>
             <a:pPr marL="0" indent="0">
@@ -11901,6 +11927,32 @@
               <a:rPr lang="en-US" b="1" dirty="0"/>
               <a:t>Cons</a:t>
             </a:r>
+          </a:p>
+          <a:p>
+            <a:r>
+              <a:rPr lang="en-US" b="1" dirty="0"/>
+              <a:t>Only really meant to make RPG’s</a:t>
+            </a:r>
+          </a:p>
+          <a:p>
+            <a:r>
+              <a:rPr lang="en-US" b="1" dirty="0"/>
+              <a:t>Coding for it has next to no documentation</a:t>
+            </a:r>
+          </a:p>
+          <a:p>
+            <a:r>
+              <a:rPr lang="en-US" b="1" dirty="0"/>
+              <a:t>Has a distinctively cheap look if premade assets are used</a:t>
+            </a:r>
+          </a:p>
+          <a:p>
+            <a:r>
+              <a:rPr lang="en-US" b="1" dirty="0"/>
+              <a:t>Hard to extend functionality</a:t>
+            </a:r>
+          </a:p>
+          <a:p>
             <a:endParaRPr lang="en-US" dirty="0"/>
           </a:p>
         </p:txBody>
@@ -12135,6 +12187,18 @@
               <a:t>There is a lot of money in the scene, just not for any of us.</a:t>
             </a:r>
           </a:p>
+          <a:p>
+            <a:r>
+              <a:rPr lang="en-US" dirty="0"/>
+              <a:t>Passion does not always lead to high sales, You have to find the balance between passion and marketability. </a:t>
+            </a:r>
+          </a:p>
+          <a:p>
+            <a:r>
+              <a:rPr lang="en-US" dirty="0"/>
+              <a:t>Marketing is key, and none of us can afford marketing</a:t>
+            </a:r>
+          </a:p>
         </p:txBody>
       </p:sp>
     </p:spTree>
@@ -12151,6 +12215,132 @@
 </file>
 
 <file path=ppt/slides/slide14.xml><?xml version="1.0" encoding="utf-8"?>
+<p:sld xmlns:a="http://schemas.openxmlformats.org/drawingml/2006/main" xmlns:r="http://schemas.openxmlformats.org/officeDocument/2006/relationships" xmlns:p="http://schemas.openxmlformats.org/presentationml/2006/main">
+  <p:cSld>
+    <p:spTree>
+      <p:nvGrpSpPr>
+        <p:cNvPr id="1" name=""/>
+        <p:cNvGrpSpPr/>
+        <p:nvPr/>
+      </p:nvGrpSpPr>
+      <p:grpSpPr>
+        <a:xfrm>
+          <a:off x="0" y="0"/>
+          <a:ext cx="0" cy="0"/>
+          <a:chOff x="0" y="0"/>
+          <a:chExt cx="0" cy="0"/>
+        </a:xfrm>
+      </p:grpSpPr>
+      <p:sp>
+        <p:nvSpPr>
+          <p:cNvPr id="2" name="Title 1">
+            <a:extLst>
+              <a:ext uri="{FF2B5EF4-FFF2-40B4-BE49-F238E27FC236}">
+                <a16:creationId xmlns:a16="http://schemas.microsoft.com/office/drawing/2014/main" id="{96BEB878-A33E-4672-B69F-C76DCE9DFB83}"/>
+              </a:ext>
+            </a:extLst>
+          </p:cNvPr>
+          <p:cNvSpPr>
+            <a:spLocks noGrp="1"/>
+          </p:cNvSpPr>
+          <p:nvPr>
+            <p:ph type="title"/>
+          </p:nvPr>
+        </p:nvSpPr>
+        <p:spPr/>
+        <p:txBody>
+          <a:bodyPr/>
+          <a:lstStyle/>
+          <a:p>
+            <a:r>
+              <a:rPr lang="en-US" dirty="0"/>
+              <a:t>Useful Resources</a:t>
+            </a:r>
+          </a:p>
+        </p:txBody>
+      </p:sp>
+      <p:sp>
+        <p:nvSpPr>
+          <p:cNvPr id="3" name="Content Placeholder 2">
+            <a:extLst>
+              <a:ext uri="{FF2B5EF4-FFF2-40B4-BE49-F238E27FC236}">
+                <a16:creationId xmlns:a16="http://schemas.microsoft.com/office/drawing/2014/main" id="{87F1C4CA-2D5C-403A-8FBC-2930A10CA764}"/>
+              </a:ext>
+            </a:extLst>
+          </p:cNvPr>
+          <p:cNvSpPr>
+            <a:spLocks noGrp="1"/>
+          </p:cNvSpPr>
+          <p:nvPr>
+            <p:ph idx="1"/>
+          </p:nvPr>
+        </p:nvSpPr>
+        <p:spPr/>
+        <p:txBody>
+          <a:bodyPr/>
+          <a:lstStyle/>
+          <a:p>
+            <a:r>
+              <a:rPr lang="en-US" dirty="0"/>
+              <a:t>Itch.io – Lots of </a:t>
+            </a:r>
+            <a:r>
+              <a:rPr lang="en-US" dirty="0" err="1"/>
+              <a:t>devs</a:t>
+            </a:r>
+            <a:r>
+              <a:rPr lang="en-US" dirty="0"/>
+              <a:t> release asset packs and tools for free or on the cheap.</a:t>
+            </a:r>
+          </a:p>
+          <a:p>
+            <a:r>
+              <a:rPr lang="en-US" dirty="0"/>
+              <a:t>Reddit (r/</a:t>
+            </a:r>
+            <a:r>
+              <a:rPr lang="en-US" dirty="0" err="1"/>
+              <a:t>Gamedev</a:t>
+            </a:r>
+            <a:r>
+              <a:rPr lang="en-US" dirty="0"/>
+              <a:t>, r/[insert engine]) – lots of useful posts and help on engine specific problems</a:t>
+            </a:r>
+          </a:p>
+          <a:p>
+            <a:r>
+              <a:rPr lang="en-US" dirty="0"/>
+              <a:t>Stack Overflow – More on the coding side, but there is nothing these people can’t answer.</a:t>
+            </a:r>
+          </a:p>
+          <a:p>
+            <a:r>
+              <a:rPr lang="en-US" dirty="0"/>
+              <a:t>The Official Forums for your Engine – Much like the others, there is specific help and mods that actually work for the company that supports the engine. </a:t>
+            </a:r>
+          </a:p>
+          <a:p>
+            <a:r>
+              <a:rPr lang="en-US" dirty="0"/>
+              <a:t>OpenGameArt.com – Literally thousands of free assets to use in prototypes and jams</a:t>
+            </a:r>
+          </a:p>
+        </p:txBody>
+      </p:sp>
+    </p:spTree>
+    <p:extLst>
+      <p:ext uri="{BB962C8B-B14F-4D97-AF65-F5344CB8AC3E}">
+        <p14:creationId xmlns:p14="http://schemas.microsoft.com/office/powerpoint/2010/main" val="1815729047"/>
+      </p:ext>
+    </p:extLst>
+  </p:cSld>
+  <p:clrMapOvr>
+    <a:masterClrMapping/>
+  </p:clrMapOvr>
+</p:sld>
+</file>
+
+<file path=ppt/slides/slide15.xml><?xml version="1.0" encoding="utf-8"?>
 <p:sld xmlns:a="http://schemas.openxmlformats.org/drawingml/2006/main" xmlns:r="http://schemas.openxmlformats.org/officeDocument/2006/relationships" xmlns:p="http://schemas.openxmlformats.org/presentationml/2006/main">
   <p:cSld>
     <p:bg>
@@ -18145,7 +18335,9 @@
           </a:xfrm>
         </p:spPr>
         <p:txBody>
-          <a:bodyPr/>
+          <a:bodyPr>
+            <a:normAutofit lnSpcReduction="10000"/>
+          </a:bodyPr>
           <a:lstStyle/>
           <a:p>
             <a:pPr marL="0" indent="0">
@@ -18178,6 +18370,12 @@
             <a:r>
               <a:rPr lang="en-US" dirty="0"/>
               <a:t>One of the most thoroughly documented engines</a:t>
+            </a:r>
+          </a:p>
+          <a:p>
+            <a:r>
+              <a:rPr lang="en-US" dirty="0"/>
+              <a:t>Ability to extend the editor functionality with script</a:t>
             </a:r>
           </a:p>
           <a:p>
@@ -18325,7 +18523,9 @@
           </a:xfrm>
         </p:spPr>
         <p:txBody>
-          <a:bodyPr/>
+          <a:bodyPr>
+            <a:normAutofit fontScale="85000" lnSpcReduction="20000"/>
+          </a:bodyPr>
           <a:lstStyle/>
           <a:p>
             <a:pPr marL="0" indent="0">
@@ -18333,7 +18533,31 @@
             </a:pPr>
             <a:r>
               <a:rPr lang="en-US" b="1" dirty="0"/>
-              <a:t>Pros</a:t>
+              <a:t>Pros- </a:t>
+            </a:r>
+          </a:p>
+          <a:p>
+            <a:r>
+              <a:rPr lang="en-US" b="1" dirty="0"/>
+              <a:t>High Quality Rendering Pipeline – Pretty Graphics!</a:t>
+            </a:r>
+          </a:p>
+          <a:p>
+            <a:r>
+              <a:rPr lang="en-US" b="1" dirty="0"/>
+              <a:t>In-Engine Material Editor</a:t>
+            </a:r>
+          </a:p>
+          <a:p>
+            <a:r>
+              <a:rPr lang="en-US" b="1" dirty="0"/>
+              <a:t>Access to source code</a:t>
+            </a:r>
+          </a:p>
+          <a:p>
+            <a:r>
+              <a:rPr lang="en-US" b="1" dirty="0"/>
+              <a:t>Visual scripting</a:t>
             </a:r>
             <a:endParaRPr lang="en-US" dirty="0"/>
           </a:p>
@@ -18345,7 +18569,36 @@
               <a:rPr lang="en-US" b="1" dirty="0"/>
               <a:t>Cons</a:t>
             </a:r>
-            <a:endParaRPr lang="en-US" dirty="0"/>
+          </a:p>
+          <a:p>
+            <a:r>
+              <a:rPr lang="en-US" b="1" dirty="0"/>
+              <a:t>High learning curve </a:t>
+            </a:r>
+          </a:p>
+          <a:p>
+            <a:r>
+              <a:rPr lang="en-US" b="1" dirty="0"/>
+              <a:t>Lack of Documentation</a:t>
+            </a:r>
+          </a:p>
+          <a:p>
+            <a:r>
+              <a:rPr lang="en-US" b="1" dirty="0"/>
+              <a:t>Large project size</a:t>
+            </a:r>
+          </a:p>
+          <a:p>
+            <a:r>
+              <a:rPr lang="en-US" b="1" dirty="0"/>
+              <a:t>Expected to use Blueprints – can get messy and hard to maintain</a:t>
+            </a:r>
+          </a:p>
+          <a:p>
+            <a:r>
+              <a:rPr lang="en-US" b="1" dirty="0"/>
+              <a:t>2D support is lacking, and it doesn’t seem to be a focus at Epic</a:t>
+            </a:r>
           </a:p>
         </p:txBody>
       </p:sp>

</xml_diff>